<commit_message>
add architecture and insert check folder task
</commit_message>
<xml_diff>
--- a/Architecture-Overview.pptx
+++ b/Architecture-Overview.pptx
@@ -6,6 +6,7 @@
   </p:sldMasterIdLst>
   <p:sldIdLst>
     <p:sldId id="256" r:id="rId2"/>
+    <p:sldId id="257" r:id="rId3"/>
   </p:sldIdLst>
   <p:sldSz cx="12192000" cy="6858000"/>
   <p:notesSz cx="6858000" cy="9144000"/>
@@ -243,7 +244,7 @@
           <a:p>
             <a:fld id="{FB965CEE-315E-405C-BA70-ED45D4E0DFFE}" type="datetimeFigureOut">
               <a:rPr lang="de-DE" smtClean="0"/>
-              <a:t>18.12.2020</a:t>
+              <a:t>17.01.2021</a:t>
             </a:fld>
             <a:endParaRPr lang="de-DE"/>
           </a:p>
@@ -413,7 +414,7 @@
           <a:p>
             <a:fld id="{FB965CEE-315E-405C-BA70-ED45D4E0DFFE}" type="datetimeFigureOut">
               <a:rPr lang="de-DE" smtClean="0"/>
-              <a:t>18.12.2020</a:t>
+              <a:t>17.01.2021</a:t>
             </a:fld>
             <a:endParaRPr lang="de-DE"/>
           </a:p>
@@ -593,7 +594,7 @@
           <a:p>
             <a:fld id="{FB965CEE-315E-405C-BA70-ED45D4E0DFFE}" type="datetimeFigureOut">
               <a:rPr lang="de-DE" smtClean="0"/>
-              <a:t>18.12.2020</a:t>
+              <a:t>17.01.2021</a:t>
             </a:fld>
             <a:endParaRPr lang="de-DE"/>
           </a:p>
@@ -763,7 +764,7 @@
           <a:p>
             <a:fld id="{FB965CEE-315E-405C-BA70-ED45D4E0DFFE}" type="datetimeFigureOut">
               <a:rPr lang="de-DE" smtClean="0"/>
-              <a:t>18.12.2020</a:t>
+              <a:t>17.01.2021</a:t>
             </a:fld>
             <a:endParaRPr lang="de-DE"/>
           </a:p>
@@ -1009,7 +1010,7 @@
           <a:p>
             <a:fld id="{FB965CEE-315E-405C-BA70-ED45D4E0DFFE}" type="datetimeFigureOut">
               <a:rPr lang="de-DE" smtClean="0"/>
-              <a:t>18.12.2020</a:t>
+              <a:t>17.01.2021</a:t>
             </a:fld>
             <a:endParaRPr lang="de-DE"/>
           </a:p>
@@ -1241,7 +1242,7 @@
           <a:p>
             <a:fld id="{FB965CEE-315E-405C-BA70-ED45D4E0DFFE}" type="datetimeFigureOut">
               <a:rPr lang="de-DE" smtClean="0"/>
-              <a:t>18.12.2020</a:t>
+              <a:t>17.01.2021</a:t>
             </a:fld>
             <a:endParaRPr lang="de-DE"/>
           </a:p>
@@ -1608,7 +1609,7 @@
           <a:p>
             <a:fld id="{FB965CEE-315E-405C-BA70-ED45D4E0DFFE}" type="datetimeFigureOut">
               <a:rPr lang="de-DE" smtClean="0"/>
-              <a:t>18.12.2020</a:t>
+              <a:t>17.01.2021</a:t>
             </a:fld>
             <a:endParaRPr lang="de-DE"/>
           </a:p>
@@ -1726,7 +1727,7 @@
           <a:p>
             <a:fld id="{FB965CEE-315E-405C-BA70-ED45D4E0DFFE}" type="datetimeFigureOut">
               <a:rPr lang="de-DE" smtClean="0"/>
-              <a:t>18.12.2020</a:t>
+              <a:t>17.01.2021</a:t>
             </a:fld>
             <a:endParaRPr lang="de-DE"/>
           </a:p>
@@ -1821,7 +1822,7 @@
           <a:p>
             <a:fld id="{FB965CEE-315E-405C-BA70-ED45D4E0DFFE}" type="datetimeFigureOut">
               <a:rPr lang="de-DE" smtClean="0"/>
-              <a:t>18.12.2020</a:t>
+              <a:t>17.01.2021</a:t>
             </a:fld>
             <a:endParaRPr lang="de-DE"/>
           </a:p>
@@ -2098,7 +2099,7 @@
           <a:p>
             <a:fld id="{FB965CEE-315E-405C-BA70-ED45D4E0DFFE}" type="datetimeFigureOut">
               <a:rPr lang="de-DE" smtClean="0"/>
-              <a:t>18.12.2020</a:t>
+              <a:t>17.01.2021</a:t>
             </a:fld>
             <a:endParaRPr lang="de-DE"/>
           </a:p>
@@ -2351,7 +2352,7 @@
           <a:p>
             <a:fld id="{FB965CEE-315E-405C-BA70-ED45D4E0DFFE}" type="datetimeFigureOut">
               <a:rPr lang="de-DE" smtClean="0"/>
-              <a:t>18.12.2020</a:t>
+              <a:t>17.01.2021</a:t>
             </a:fld>
             <a:endParaRPr lang="de-DE"/>
           </a:p>
@@ -2564,7 +2565,7 @@
           <a:p>
             <a:fld id="{FB965CEE-315E-405C-BA70-ED45D4E0DFFE}" type="datetimeFigureOut">
               <a:rPr lang="de-DE" smtClean="0"/>
-              <a:t>18.12.2020</a:t>
+              <a:t>17.01.2021</a:t>
             </a:fld>
             <a:endParaRPr lang="de-DE"/>
           </a:p>
@@ -3414,8 +3415,8 @@
         </p:nvSpPr>
         <p:spPr>
           <a:xfrm>
-            <a:off x="3180521" y="4200939"/>
-            <a:ext cx="8328991" cy="563218"/>
+            <a:off x="3783495" y="4200939"/>
+            <a:ext cx="7613371" cy="563218"/>
           </a:xfrm>
           <a:prstGeom prst="rect">
             <a:avLst/>
@@ -3444,7 +3445,11 @@
             <a:pPr algn="ctr"/>
             <a:r>
               <a:rPr lang="de-DE" dirty="0" smtClean="0"/>
-              <a:t>Internal Network 192.168.111.0/26</a:t>
+              <a:t>Internal Network </a:t>
+            </a:r>
+            <a:r>
+              <a:rPr lang="de-DE" dirty="0" smtClean="0"/>
+              <a:t>11.11.11.0/24</a:t>
             </a:r>
             <a:endParaRPr lang="de-DE" dirty="0"/>
           </a:p>
@@ -4794,6 +4799,2035 @@
 </p:sld>
 </file>
 
+<file path=ppt/slides/slide2.xml><?xml version="1.0" encoding="utf-8"?>
+<p:sld xmlns:a="http://schemas.openxmlformats.org/drawingml/2006/main" xmlns:r="http://schemas.openxmlformats.org/officeDocument/2006/relationships" xmlns:p="http://schemas.openxmlformats.org/presentationml/2006/main">
+  <p:cSld>
+    <p:spTree>
+      <p:nvGrpSpPr>
+        <p:cNvPr id="1" name=""/>
+        <p:cNvGrpSpPr/>
+        <p:nvPr/>
+      </p:nvGrpSpPr>
+      <p:grpSpPr>
+        <a:xfrm>
+          <a:off x="0" y="0"/>
+          <a:ext cx="0" cy="0"/>
+          <a:chOff x="0" y="0"/>
+          <a:chExt cx="0" cy="0"/>
+        </a:xfrm>
+      </p:grpSpPr>
+      <p:sp>
+        <p:nvSpPr>
+          <p:cNvPr id="8" name="Rechteck 7"/>
+          <p:cNvSpPr/>
+          <p:nvPr/>
+        </p:nvSpPr>
+        <p:spPr>
+          <a:xfrm>
+            <a:off x="2789583" y="225288"/>
+            <a:ext cx="9011478" cy="4764156"/>
+          </a:xfrm>
+          <a:prstGeom prst="rect">
+            <a:avLst/>
+          </a:prstGeom>
+          <a:noFill/>
+          <a:ln>
+            <a:prstDash val="dash"/>
+          </a:ln>
+        </p:spPr>
+        <p:style>
+          <a:lnRef idx="2">
+            <a:schemeClr val="accent1">
+              <a:shade val="50000"/>
+            </a:schemeClr>
+          </a:lnRef>
+          <a:fillRef idx="1">
+            <a:schemeClr val="accent1"/>
+          </a:fillRef>
+          <a:effectRef idx="0">
+            <a:schemeClr val="accent1"/>
+          </a:effectRef>
+          <a:fontRef idx="minor">
+            <a:schemeClr val="lt1"/>
+          </a:fontRef>
+        </p:style>
+        <p:txBody>
+          <a:bodyPr rtlCol="0" anchor="ctr"/>
+          <a:lstStyle/>
+          <a:p>
+            <a:pPr algn="ctr"/>
+            <a:endParaRPr lang="de-DE"/>
+          </a:p>
+        </p:txBody>
+      </p:sp>
+      <p:sp>
+        <p:nvSpPr>
+          <p:cNvPr id="9" name="Rechteck 8"/>
+          <p:cNvSpPr/>
+          <p:nvPr/>
+        </p:nvSpPr>
+        <p:spPr>
+          <a:xfrm>
+            <a:off x="278296" y="5189883"/>
+            <a:ext cx="11522765" cy="1033670"/>
+          </a:xfrm>
+          <a:prstGeom prst="rect">
+            <a:avLst/>
+          </a:prstGeom>
+        </p:spPr>
+        <p:style>
+          <a:lnRef idx="2">
+            <a:schemeClr val="accent1">
+              <a:shade val="50000"/>
+            </a:schemeClr>
+          </a:lnRef>
+          <a:fillRef idx="1">
+            <a:schemeClr val="accent1"/>
+          </a:fillRef>
+          <a:effectRef idx="0">
+            <a:schemeClr val="accent1"/>
+          </a:effectRef>
+          <a:fontRef idx="minor">
+            <a:schemeClr val="lt1"/>
+          </a:fontRef>
+        </p:style>
+        <p:txBody>
+          <a:bodyPr rtlCol="0" anchor="ctr"/>
+          <a:lstStyle/>
+          <a:p>
+            <a:pPr algn="ctr"/>
+            <a:r>
+              <a:rPr lang="de-DE" dirty="0" err="1" smtClean="0"/>
+              <a:t>openshift.home.local</a:t>
+            </a:r>
+            <a:endParaRPr lang="de-DE" dirty="0"/>
+          </a:p>
+        </p:txBody>
+      </p:sp>
+      <p:sp>
+        <p:nvSpPr>
+          <p:cNvPr id="10" name="Rechteck 9"/>
+          <p:cNvSpPr/>
+          <p:nvPr/>
+        </p:nvSpPr>
+        <p:spPr>
+          <a:xfrm>
+            <a:off x="7759039" y="380170"/>
+            <a:ext cx="1762539" cy="1033670"/>
+          </a:xfrm>
+          <a:prstGeom prst="rect">
+            <a:avLst/>
+          </a:prstGeom>
+          <a:solidFill>
+            <a:srgbClr val="C00000"/>
+          </a:solidFill>
+        </p:spPr>
+        <p:style>
+          <a:lnRef idx="2">
+            <a:schemeClr val="accent1">
+              <a:shade val="50000"/>
+            </a:schemeClr>
+          </a:lnRef>
+          <a:fillRef idx="1">
+            <a:schemeClr val="accent1"/>
+          </a:fillRef>
+          <a:effectRef idx="0">
+            <a:schemeClr val="accent1"/>
+          </a:effectRef>
+          <a:fontRef idx="minor">
+            <a:schemeClr val="lt1"/>
+          </a:fontRef>
+        </p:style>
+        <p:txBody>
+          <a:bodyPr rtlCol="0" anchor="ctr"/>
+          <a:lstStyle/>
+          <a:p>
+            <a:pPr algn="ctr"/>
+            <a:r>
+              <a:rPr lang="de-DE" dirty="0" smtClean="0"/>
+              <a:t>ocpmaster1</a:t>
+            </a:r>
+          </a:p>
+          <a:p>
+            <a:pPr algn="ctr"/>
+            <a:r>
+              <a:rPr lang="de-DE" dirty="0" smtClean="0"/>
+              <a:t>11.11.11.121</a:t>
+            </a:r>
+            <a:endParaRPr lang="de-DE" dirty="0"/>
+          </a:p>
+        </p:txBody>
+      </p:sp>
+      <p:sp>
+        <p:nvSpPr>
+          <p:cNvPr id="11" name="Rechteck 10"/>
+          <p:cNvSpPr/>
+          <p:nvPr/>
+        </p:nvSpPr>
+        <p:spPr>
+          <a:xfrm>
+            <a:off x="7759039" y="1533939"/>
+            <a:ext cx="1762539" cy="1033670"/>
+          </a:xfrm>
+          <a:prstGeom prst="rect">
+            <a:avLst/>
+          </a:prstGeom>
+          <a:solidFill>
+            <a:srgbClr val="C00000"/>
+          </a:solidFill>
+        </p:spPr>
+        <p:style>
+          <a:lnRef idx="2">
+            <a:schemeClr val="accent1">
+              <a:shade val="50000"/>
+            </a:schemeClr>
+          </a:lnRef>
+          <a:fillRef idx="1">
+            <a:schemeClr val="accent1"/>
+          </a:fillRef>
+          <a:effectRef idx="0">
+            <a:schemeClr val="accent1"/>
+          </a:effectRef>
+          <a:fontRef idx="minor">
+            <a:schemeClr val="lt1"/>
+          </a:fontRef>
+        </p:style>
+        <p:txBody>
+          <a:bodyPr rtlCol="0" anchor="ctr"/>
+          <a:lstStyle/>
+          <a:p>
+            <a:pPr algn="ctr"/>
+            <a:r>
+              <a:rPr lang="de-DE" dirty="0" smtClean="0"/>
+              <a:t>ocpmaster</a:t>
+            </a:r>
+            <a:r>
+              <a:rPr lang="de-DE" dirty="0" smtClean="0"/>
+              <a:t>2</a:t>
+            </a:r>
+          </a:p>
+          <a:p>
+            <a:pPr algn="ctr"/>
+            <a:r>
+              <a:rPr lang="de-DE" dirty="0" smtClean="0"/>
+              <a:t>11.11.11.122</a:t>
+            </a:r>
+            <a:endParaRPr lang="de-DE" dirty="0"/>
+          </a:p>
+        </p:txBody>
+      </p:sp>
+      <p:sp>
+        <p:nvSpPr>
+          <p:cNvPr id="12" name="Rechteck 11"/>
+          <p:cNvSpPr/>
+          <p:nvPr/>
+        </p:nvSpPr>
+        <p:spPr>
+          <a:xfrm>
+            <a:off x="7759036" y="2722079"/>
+            <a:ext cx="1762539" cy="1033670"/>
+          </a:xfrm>
+          <a:prstGeom prst="rect">
+            <a:avLst/>
+          </a:prstGeom>
+          <a:solidFill>
+            <a:srgbClr val="C00000"/>
+          </a:solidFill>
+        </p:spPr>
+        <p:style>
+          <a:lnRef idx="2">
+            <a:schemeClr val="accent1">
+              <a:shade val="50000"/>
+            </a:schemeClr>
+          </a:lnRef>
+          <a:fillRef idx="1">
+            <a:schemeClr val="accent1"/>
+          </a:fillRef>
+          <a:effectRef idx="0">
+            <a:schemeClr val="accent1"/>
+          </a:effectRef>
+          <a:fontRef idx="minor">
+            <a:schemeClr val="lt1"/>
+          </a:fontRef>
+        </p:style>
+        <p:txBody>
+          <a:bodyPr rtlCol="0" anchor="ctr"/>
+          <a:lstStyle/>
+          <a:p>
+            <a:pPr algn="ctr"/>
+            <a:r>
+              <a:rPr lang="de-DE" dirty="0" smtClean="0"/>
+              <a:t>ocpmaster3</a:t>
+            </a:r>
+          </a:p>
+          <a:p>
+            <a:pPr algn="ctr"/>
+            <a:r>
+              <a:rPr lang="de-DE" dirty="0" smtClean="0"/>
+              <a:t>11.11.11.123</a:t>
+            </a:r>
+            <a:endParaRPr lang="de-DE" dirty="0"/>
+          </a:p>
+        </p:txBody>
+      </p:sp>
+      <p:sp>
+        <p:nvSpPr>
+          <p:cNvPr id="13" name="Rechteck 12"/>
+          <p:cNvSpPr/>
+          <p:nvPr/>
+        </p:nvSpPr>
+        <p:spPr>
+          <a:xfrm>
+            <a:off x="9660725" y="380170"/>
+            <a:ext cx="1762539" cy="1033670"/>
+          </a:xfrm>
+          <a:prstGeom prst="rect">
+            <a:avLst/>
+          </a:prstGeom>
+          <a:solidFill>
+            <a:schemeClr val="accent2"/>
+          </a:solidFill>
+        </p:spPr>
+        <p:style>
+          <a:lnRef idx="2">
+            <a:schemeClr val="accent1">
+              <a:shade val="50000"/>
+            </a:schemeClr>
+          </a:lnRef>
+          <a:fillRef idx="1">
+            <a:schemeClr val="accent1"/>
+          </a:fillRef>
+          <a:effectRef idx="0">
+            <a:schemeClr val="accent1"/>
+          </a:effectRef>
+          <a:fontRef idx="minor">
+            <a:schemeClr val="lt1"/>
+          </a:fontRef>
+        </p:style>
+        <p:txBody>
+          <a:bodyPr rtlCol="0" anchor="ctr"/>
+          <a:lstStyle/>
+          <a:p>
+            <a:pPr algn="ctr"/>
+            <a:r>
+              <a:rPr lang="de-DE" dirty="0" smtClean="0"/>
+              <a:t>ocpworker1</a:t>
+            </a:r>
+          </a:p>
+          <a:p>
+            <a:pPr algn="ctr"/>
+            <a:r>
+              <a:rPr lang="de-DE" dirty="0" smtClean="0"/>
+              <a:t>11.11.11.124</a:t>
+            </a:r>
+            <a:endParaRPr lang="de-DE" dirty="0"/>
+          </a:p>
+        </p:txBody>
+      </p:sp>
+      <p:sp>
+        <p:nvSpPr>
+          <p:cNvPr id="14" name="Rechteck 13"/>
+          <p:cNvSpPr/>
+          <p:nvPr/>
+        </p:nvSpPr>
+        <p:spPr>
+          <a:xfrm>
+            <a:off x="9660725" y="1533939"/>
+            <a:ext cx="1762539" cy="1033670"/>
+          </a:xfrm>
+          <a:prstGeom prst="rect">
+            <a:avLst/>
+          </a:prstGeom>
+          <a:solidFill>
+            <a:schemeClr val="accent2"/>
+          </a:solidFill>
+        </p:spPr>
+        <p:style>
+          <a:lnRef idx="2">
+            <a:schemeClr val="accent1">
+              <a:shade val="50000"/>
+            </a:schemeClr>
+          </a:lnRef>
+          <a:fillRef idx="1">
+            <a:schemeClr val="accent1"/>
+          </a:fillRef>
+          <a:effectRef idx="0">
+            <a:schemeClr val="accent1"/>
+          </a:effectRef>
+          <a:fontRef idx="minor">
+            <a:schemeClr val="lt1"/>
+          </a:fontRef>
+        </p:style>
+        <p:txBody>
+          <a:bodyPr rtlCol="0" anchor="ctr"/>
+          <a:lstStyle/>
+          <a:p>
+            <a:pPr algn="ctr"/>
+            <a:r>
+              <a:rPr lang="de-DE" dirty="0" smtClean="0"/>
+              <a:t>ocpworker2</a:t>
+            </a:r>
+          </a:p>
+          <a:p>
+            <a:pPr algn="ctr"/>
+            <a:r>
+              <a:rPr lang="de-DE" dirty="0" smtClean="0"/>
+              <a:t>11.11.11.125</a:t>
+            </a:r>
+            <a:endParaRPr lang="de-DE" dirty="0"/>
+          </a:p>
+        </p:txBody>
+      </p:sp>
+      <p:sp>
+        <p:nvSpPr>
+          <p:cNvPr id="15" name="Rechteck 14"/>
+          <p:cNvSpPr/>
+          <p:nvPr/>
+        </p:nvSpPr>
+        <p:spPr>
+          <a:xfrm>
+            <a:off x="9660724" y="2722079"/>
+            <a:ext cx="1762539" cy="1033670"/>
+          </a:xfrm>
+          <a:prstGeom prst="rect">
+            <a:avLst/>
+          </a:prstGeom>
+          <a:solidFill>
+            <a:schemeClr val="accent2"/>
+          </a:solidFill>
+        </p:spPr>
+        <p:style>
+          <a:lnRef idx="2">
+            <a:schemeClr val="accent1">
+              <a:shade val="50000"/>
+            </a:schemeClr>
+          </a:lnRef>
+          <a:fillRef idx="1">
+            <a:schemeClr val="accent1"/>
+          </a:fillRef>
+          <a:effectRef idx="0">
+            <a:schemeClr val="accent1"/>
+          </a:effectRef>
+          <a:fontRef idx="minor">
+            <a:schemeClr val="lt1"/>
+          </a:fontRef>
+        </p:style>
+        <p:txBody>
+          <a:bodyPr rtlCol="0" anchor="ctr"/>
+          <a:lstStyle/>
+          <a:p>
+            <a:pPr algn="ctr"/>
+            <a:r>
+              <a:rPr lang="de-DE" dirty="0" smtClean="0"/>
+              <a:t>ocpworker3</a:t>
+            </a:r>
+          </a:p>
+          <a:p>
+            <a:pPr algn="ctr"/>
+            <a:r>
+              <a:rPr lang="de-DE" dirty="0" smtClean="0"/>
+              <a:t>11.11.11.126</a:t>
+            </a:r>
+            <a:endParaRPr lang="de-DE" dirty="0"/>
+          </a:p>
+        </p:txBody>
+      </p:sp>
+      <p:sp>
+        <p:nvSpPr>
+          <p:cNvPr id="16" name="Rechteck 15"/>
+          <p:cNvSpPr/>
+          <p:nvPr/>
+        </p:nvSpPr>
+        <p:spPr>
+          <a:xfrm>
+            <a:off x="3783495" y="4200939"/>
+            <a:ext cx="7613371" cy="563218"/>
+          </a:xfrm>
+          <a:prstGeom prst="rect">
+            <a:avLst/>
+          </a:prstGeom>
+        </p:spPr>
+        <p:style>
+          <a:lnRef idx="2">
+            <a:schemeClr val="accent6">
+              <a:shade val="50000"/>
+            </a:schemeClr>
+          </a:lnRef>
+          <a:fillRef idx="1">
+            <a:schemeClr val="accent6"/>
+          </a:fillRef>
+          <a:effectRef idx="0">
+            <a:schemeClr val="accent6"/>
+          </a:effectRef>
+          <a:fontRef idx="minor">
+            <a:schemeClr val="lt1"/>
+          </a:fontRef>
+        </p:style>
+        <p:txBody>
+          <a:bodyPr rtlCol="0" anchor="ctr"/>
+          <a:lstStyle/>
+          <a:p>
+            <a:pPr algn="ctr"/>
+            <a:r>
+              <a:rPr lang="de-DE" dirty="0" smtClean="0"/>
+              <a:t>Internal Network </a:t>
+            </a:r>
+            <a:r>
+              <a:rPr lang="de-DE" dirty="0" smtClean="0"/>
+              <a:t>11.11.11.0/24</a:t>
+            </a:r>
+            <a:endParaRPr lang="de-DE" dirty="0"/>
+          </a:p>
+        </p:txBody>
+      </p:sp>
+      <p:sp>
+        <p:nvSpPr>
+          <p:cNvPr id="17" name="Rechteck 16"/>
+          <p:cNvSpPr/>
+          <p:nvPr/>
+        </p:nvSpPr>
+        <p:spPr>
+          <a:xfrm>
+            <a:off x="689112" y="4200939"/>
+            <a:ext cx="1762539" cy="563218"/>
+          </a:xfrm>
+          <a:prstGeom prst="rect">
+            <a:avLst/>
+          </a:prstGeom>
+        </p:spPr>
+        <p:style>
+          <a:lnRef idx="2">
+            <a:schemeClr val="accent2">
+              <a:shade val="50000"/>
+            </a:schemeClr>
+          </a:lnRef>
+          <a:fillRef idx="1">
+            <a:schemeClr val="accent2"/>
+          </a:fillRef>
+          <a:effectRef idx="0">
+            <a:schemeClr val="accent2"/>
+          </a:effectRef>
+          <a:fontRef idx="minor">
+            <a:schemeClr val="lt1"/>
+          </a:fontRef>
+        </p:style>
+        <p:txBody>
+          <a:bodyPr rtlCol="0" anchor="ctr"/>
+          <a:lstStyle/>
+          <a:p>
+            <a:pPr algn="ctr"/>
+            <a:r>
+              <a:rPr lang="de-DE" sz="1200" dirty="0" err="1" smtClean="0"/>
+              <a:t>External</a:t>
+            </a:r>
+            <a:r>
+              <a:rPr lang="de-DE" sz="1200" dirty="0" smtClean="0"/>
+              <a:t> Network 10.0.249.0/24</a:t>
+            </a:r>
+            <a:endParaRPr lang="de-DE" sz="1200" dirty="0"/>
+          </a:p>
+        </p:txBody>
+      </p:sp>
+      <p:sp>
+        <p:nvSpPr>
+          <p:cNvPr id="18" name="Rechteck 17"/>
+          <p:cNvSpPr/>
+          <p:nvPr/>
+        </p:nvSpPr>
+        <p:spPr>
+          <a:xfrm>
+            <a:off x="278296" y="225288"/>
+            <a:ext cx="2358887" cy="4764156"/>
+          </a:xfrm>
+          <a:prstGeom prst="rect">
+            <a:avLst/>
+          </a:prstGeom>
+          <a:noFill/>
+          <a:ln>
+            <a:solidFill>
+              <a:schemeClr val="accent2"/>
+            </a:solidFill>
+            <a:prstDash val="dash"/>
+          </a:ln>
+        </p:spPr>
+        <p:style>
+          <a:lnRef idx="2">
+            <a:schemeClr val="accent1">
+              <a:shade val="50000"/>
+            </a:schemeClr>
+          </a:lnRef>
+          <a:fillRef idx="1">
+            <a:schemeClr val="accent1"/>
+          </a:fillRef>
+          <a:effectRef idx="0">
+            <a:schemeClr val="accent1"/>
+          </a:effectRef>
+          <a:fontRef idx="minor">
+            <a:schemeClr val="lt1"/>
+          </a:fontRef>
+        </p:style>
+        <p:txBody>
+          <a:bodyPr rtlCol="0" anchor="ctr"/>
+          <a:lstStyle/>
+          <a:p>
+            <a:pPr algn="ctr"/>
+            <a:endParaRPr lang="de-DE"/>
+          </a:p>
+        </p:txBody>
+      </p:sp>
+      <p:sp>
+        <p:nvSpPr>
+          <p:cNvPr id="21" name="Rechteck 20"/>
+          <p:cNvSpPr/>
+          <p:nvPr/>
+        </p:nvSpPr>
+        <p:spPr>
+          <a:xfrm>
+            <a:off x="3783495" y="1551734"/>
+            <a:ext cx="1762539" cy="1033670"/>
+          </a:xfrm>
+          <a:prstGeom prst="rect">
+            <a:avLst/>
+          </a:prstGeom>
+          <a:solidFill>
+            <a:schemeClr val="accent6"/>
+          </a:solidFill>
+        </p:spPr>
+        <p:style>
+          <a:lnRef idx="2">
+            <a:schemeClr val="accent1">
+              <a:shade val="50000"/>
+            </a:schemeClr>
+          </a:lnRef>
+          <a:fillRef idx="1">
+            <a:schemeClr val="accent1"/>
+          </a:fillRef>
+          <a:effectRef idx="0">
+            <a:schemeClr val="accent1"/>
+          </a:effectRef>
+          <a:fontRef idx="minor">
+            <a:schemeClr val="lt1"/>
+          </a:fontRef>
+        </p:style>
+        <p:txBody>
+          <a:bodyPr rtlCol="0" anchor="ctr"/>
+          <a:lstStyle/>
+          <a:p>
+            <a:pPr algn="ctr"/>
+            <a:r>
+              <a:rPr lang="de-DE" sz="1400" dirty="0" err="1" smtClean="0"/>
+              <a:t>ocpbastion</a:t>
+            </a:r>
+            <a:endParaRPr lang="de-DE" sz="1400" dirty="0" smtClean="0"/>
+          </a:p>
+          <a:p>
+            <a:pPr algn="ctr"/>
+            <a:r>
+              <a:rPr lang="de-DE" sz="1400" dirty="0" smtClean="0"/>
+              <a:t>11.11.11.120</a:t>
+            </a:r>
+            <a:endParaRPr lang="de-DE" sz="1400" dirty="0" smtClean="0"/>
+          </a:p>
+          <a:p>
+            <a:pPr algn="ctr"/>
+            <a:r>
+              <a:rPr lang="de-DE" sz="1400" dirty="0" smtClean="0"/>
+              <a:t>DNS</a:t>
+            </a:r>
+          </a:p>
+          <a:p>
+            <a:pPr algn="ctr"/>
+            <a:r>
+              <a:rPr lang="de-DE" sz="1400" dirty="0" smtClean="0"/>
+              <a:t>DHCP</a:t>
+            </a:r>
+          </a:p>
+          <a:p>
+            <a:pPr algn="ctr"/>
+            <a:r>
+              <a:rPr lang="de-DE" sz="1400" dirty="0" smtClean="0"/>
+              <a:t>PXE/TFTP</a:t>
+            </a:r>
+            <a:endParaRPr lang="de-DE" sz="1400" dirty="0"/>
+          </a:p>
+        </p:txBody>
+      </p:sp>
+      <p:sp>
+        <p:nvSpPr>
+          <p:cNvPr id="22" name="Rechteck 21"/>
+          <p:cNvSpPr/>
+          <p:nvPr/>
+        </p:nvSpPr>
+        <p:spPr>
+          <a:xfrm>
+            <a:off x="3776871" y="380170"/>
+            <a:ext cx="1762539" cy="1033670"/>
+          </a:xfrm>
+          <a:prstGeom prst="rect">
+            <a:avLst/>
+          </a:prstGeom>
+          <a:solidFill>
+            <a:srgbClr val="00B0F0"/>
+          </a:solidFill>
+        </p:spPr>
+        <p:style>
+          <a:lnRef idx="2">
+            <a:schemeClr val="accent1">
+              <a:shade val="50000"/>
+            </a:schemeClr>
+          </a:lnRef>
+          <a:fillRef idx="1">
+            <a:schemeClr val="accent1"/>
+          </a:fillRef>
+          <a:effectRef idx="0">
+            <a:schemeClr val="accent1"/>
+          </a:effectRef>
+          <a:fontRef idx="minor">
+            <a:schemeClr val="lt1"/>
+          </a:fontRef>
+        </p:style>
+        <p:txBody>
+          <a:bodyPr rtlCol="0" anchor="ctr"/>
+          <a:lstStyle/>
+          <a:p>
+            <a:pPr algn="ctr"/>
+            <a:r>
+              <a:rPr lang="de-DE" dirty="0" err="1" smtClean="0"/>
+              <a:t>ocpregistry</a:t>
+            </a:r>
+            <a:endParaRPr lang="de-DE" dirty="0" smtClean="0"/>
+          </a:p>
+          <a:p>
+            <a:pPr algn="ctr"/>
+            <a:r>
+              <a:rPr lang="de-DE" dirty="0" smtClean="0"/>
+              <a:t>11.11.11.130</a:t>
+            </a:r>
+            <a:endParaRPr lang="de-DE" dirty="0"/>
+          </a:p>
+        </p:txBody>
+      </p:sp>
+      <p:sp>
+        <p:nvSpPr>
+          <p:cNvPr id="23" name="Rechteck 22"/>
+          <p:cNvSpPr/>
+          <p:nvPr/>
+        </p:nvSpPr>
+        <p:spPr>
+          <a:xfrm>
+            <a:off x="3776870" y="2722079"/>
+            <a:ext cx="1762539" cy="1033670"/>
+          </a:xfrm>
+          <a:prstGeom prst="rect">
+            <a:avLst/>
+          </a:prstGeom>
+          <a:solidFill>
+            <a:schemeClr val="accent3"/>
+          </a:solidFill>
+        </p:spPr>
+        <p:style>
+          <a:lnRef idx="2">
+            <a:schemeClr val="accent1">
+              <a:shade val="50000"/>
+            </a:schemeClr>
+          </a:lnRef>
+          <a:fillRef idx="1">
+            <a:schemeClr val="accent1"/>
+          </a:fillRef>
+          <a:effectRef idx="0">
+            <a:schemeClr val="accent1"/>
+          </a:effectRef>
+          <a:fontRef idx="minor">
+            <a:schemeClr val="lt1"/>
+          </a:fontRef>
+        </p:style>
+        <p:txBody>
+          <a:bodyPr rtlCol="0" anchor="ctr"/>
+          <a:lstStyle/>
+          <a:p>
+            <a:pPr algn="ctr"/>
+            <a:r>
+              <a:rPr lang="de-DE" dirty="0" smtClean="0"/>
+              <a:t>ocplb01</a:t>
+            </a:r>
+          </a:p>
+          <a:p>
+            <a:pPr algn="ctr"/>
+            <a:r>
+              <a:rPr lang="de-DE" dirty="0" smtClean="0"/>
+              <a:t>11.11.11.128</a:t>
+            </a:r>
+            <a:endParaRPr lang="de-DE" dirty="0" smtClean="0"/>
+          </a:p>
+          <a:p>
+            <a:pPr algn="ctr"/>
+            <a:r>
+              <a:rPr lang="de-DE" dirty="0" err="1" smtClean="0"/>
+              <a:t>haproxy</a:t>
+            </a:r>
+            <a:endParaRPr lang="de-DE" dirty="0"/>
+          </a:p>
+        </p:txBody>
+      </p:sp>
+      <p:sp>
+        <p:nvSpPr>
+          <p:cNvPr id="32" name="Rechteck 31"/>
+          <p:cNvSpPr/>
+          <p:nvPr/>
+        </p:nvSpPr>
+        <p:spPr>
+          <a:xfrm>
+            <a:off x="5745535" y="1551734"/>
+            <a:ext cx="1762539" cy="1033670"/>
+          </a:xfrm>
+          <a:prstGeom prst="rect">
+            <a:avLst/>
+          </a:prstGeom>
+          <a:solidFill>
+            <a:schemeClr val="accent2"/>
+          </a:solidFill>
+        </p:spPr>
+        <p:style>
+          <a:lnRef idx="2">
+            <a:schemeClr val="accent1">
+              <a:shade val="50000"/>
+            </a:schemeClr>
+          </a:lnRef>
+          <a:fillRef idx="1">
+            <a:schemeClr val="accent1"/>
+          </a:fillRef>
+          <a:effectRef idx="0">
+            <a:schemeClr val="accent1"/>
+          </a:effectRef>
+          <a:fontRef idx="minor">
+            <a:schemeClr val="lt1"/>
+          </a:fontRef>
+        </p:style>
+        <p:txBody>
+          <a:bodyPr rtlCol="0" anchor="ctr"/>
+          <a:lstStyle/>
+          <a:p>
+            <a:pPr algn="ctr"/>
+            <a:r>
+              <a:rPr lang="de-DE" dirty="0" err="1" smtClean="0"/>
+              <a:t>ocpbootstrap</a:t>
+            </a:r>
+            <a:endParaRPr lang="de-DE" dirty="0" smtClean="0"/>
+          </a:p>
+          <a:p>
+            <a:pPr algn="ctr"/>
+            <a:r>
+              <a:rPr lang="de-DE" dirty="0" smtClean="0"/>
+              <a:t>11.11.11.127</a:t>
+            </a:r>
+            <a:endParaRPr lang="de-DE" dirty="0"/>
+          </a:p>
+        </p:txBody>
+      </p:sp>
+      <p:sp>
+        <p:nvSpPr>
+          <p:cNvPr id="4" name="Rechteck 3"/>
+          <p:cNvSpPr/>
+          <p:nvPr/>
+        </p:nvSpPr>
+        <p:spPr>
+          <a:xfrm>
+            <a:off x="685799" y="2331967"/>
+            <a:ext cx="1762539" cy="1033670"/>
+          </a:xfrm>
+          <a:prstGeom prst="rect">
+            <a:avLst/>
+          </a:prstGeom>
+        </p:spPr>
+        <p:style>
+          <a:lnRef idx="2">
+            <a:schemeClr val="accent1">
+              <a:shade val="50000"/>
+            </a:schemeClr>
+          </a:lnRef>
+          <a:fillRef idx="1">
+            <a:schemeClr val="accent1"/>
+          </a:fillRef>
+          <a:effectRef idx="0">
+            <a:schemeClr val="accent1"/>
+          </a:effectRef>
+          <a:fontRef idx="minor">
+            <a:schemeClr val="lt1"/>
+          </a:fontRef>
+        </p:style>
+        <p:txBody>
+          <a:bodyPr rtlCol="0" anchor="ctr"/>
+          <a:lstStyle/>
+          <a:p>
+            <a:pPr algn="ctr"/>
+            <a:r>
+              <a:rPr lang="de-DE" dirty="0" err="1" smtClean="0"/>
+              <a:t>Install</a:t>
+            </a:r>
+            <a:r>
+              <a:rPr lang="de-DE" dirty="0" smtClean="0"/>
+              <a:t> VM</a:t>
+            </a:r>
+          </a:p>
+          <a:p>
+            <a:pPr algn="ctr"/>
+            <a:r>
+              <a:rPr lang="de-DE" dirty="0" smtClean="0"/>
+              <a:t>Notebook</a:t>
+            </a:r>
+            <a:endParaRPr lang="de-DE" dirty="0"/>
+          </a:p>
+        </p:txBody>
+      </p:sp>
+      <p:cxnSp>
+        <p:nvCxnSpPr>
+          <p:cNvPr id="24" name="Gewinkelter Verbinder 23"/>
+          <p:cNvCxnSpPr>
+            <a:stCxn id="17" idx="0"/>
+            <a:endCxn id="4" idx="2"/>
+          </p:cNvCxnSpPr>
+          <p:nvPr/>
+        </p:nvCxnSpPr>
+        <p:spPr>
+          <a:xfrm rot="16200000" flipV="1">
+            <a:off x="1151075" y="3781631"/>
+            <a:ext cx="835302" cy="3313"/>
+          </a:xfrm>
+          <a:prstGeom prst="bentConnector3">
+            <a:avLst>
+              <a:gd name="adj1" fmla="val 50000"/>
+            </a:avLst>
+          </a:prstGeom>
+          <a:ln w="12700">
+            <a:solidFill>
+              <a:schemeClr val="accent2"/>
+            </a:solidFill>
+          </a:ln>
+        </p:spPr>
+        <p:style>
+          <a:lnRef idx="1">
+            <a:schemeClr val="accent1"/>
+          </a:lnRef>
+          <a:fillRef idx="0">
+            <a:schemeClr val="accent1"/>
+          </a:fillRef>
+          <a:effectRef idx="0">
+            <a:schemeClr val="accent1"/>
+          </a:effectRef>
+          <a:fontRef idx="minor">
+            <a:schemeClr val="tx1"/>
+          </a:fontRef>
+        </p:style>
+      </p:cxnSp>
+      <p:sp>
+        <p:nvSpPr>
+          <p:cNvPr id="27" name="Rechteck 26"/>
+          <p:cNvSpPr/>
+          <p:nvPr/>
+        </p:nvSpPr>
+        <p:spPr>
+          <a:xfrm>
+            <a:off x="1821456" y="380170"/>
+            <a:ext cx="1762539" cy="1033670"/>
+          </a:xfrm>
+          <a:prstGeom prst="rect">
+            <a:avLst/>
+          </a:prstGeom>
+        </p:spPr>
+        <p:style>
+          <a:lnRef idx="2">
+            <a:schemeClr val="accent1">
+              <a:shade val="50000"/>
+            </a:schemeClr>
+          </a:lnRef>
+          <a:fillRef idx="1">
+            <a:schemeClr val="accent1"/>
+          </a:fillRef>
+          <a:effectRef idx="0">
+            <a:schemeClr val="accent1"/>
+          </a:effectRef>
+          <a:fontRef idx="minor">
+            <a:schemeClr val="lt1"/>
+          </a:fontRef>
+        </p:style>
+        <p:txBody>
+          <a:bodyPr rtlCol="0" anchor="ctr"/>
+          <a:lstStyle/>
+          <a:p>
+            <a:pPr algn="ctr"/>
+            <a:r>
+              <a:rPr lang="de-DE" dirty="0" smtClean="0"/>
+              <a:t>Router-VM</a:t>
+            </a:r>
+            <a:endParaRPr lang="de-DE" dirty="0"/>
+          </a:p>
+        </p:txBody>
+      </p:sp>
+      <p:cxnSp>
+        <p:nvCxnSpPr>
+          <p:cNvPr id="33" name="Gewinkelter Verbinder 32"/>
+          <p:cNvCxnSpPr>
+            <a:stCxn id="16" idx="0"/>
+            <a:endCxn id="23" idx="2"/>
+          </p:cNvCxnSpPr>
+          <p:nvPr/>
+        </p:nvCxnSpPr>
+        <p:spPr>
+          <a:xfrm rot="16200000" flipV="1">
+            <a:off x="5901566" y="2512323"/>
+            <a:ext cx="445190" cy="2932041"/>
+          </a:xfrm>
+          <a:prstGeom prst="bentConnector3">
+            <a:avLst>
+              <a:gd name="adj1" fmla="val 50000"/>
+            </a:avLst>
+          </a:prstGeom>
+          <a:ln w="12700">
+            <a:solidFill>
+              <a:schemeClr val="accent6"/>
+            </a:solidFill>
+          </a:ln>
+        </p:spPr>
+        <p:style>
+          <a:lnRef idx="1">
+            <a:schemeClr val="accent1"/>
+          </a:lnRef>
+          <a:fillRef idx="0">
+            <a:schemeClr val="accent1"/>
+          </a:fillRef>
+          <a:effectRef idx="0">
+            <a:schemeClr val="accent1"/>
+          </a:effectRef>
+          <a:fontRef idx="minor">
+            <a:schemeClr val="tx1"/>
+          </a:fontRef>
+        </p:style>
+      </p:cxnSp>
+      <p:cxnSp>
+        <p:nvCxnSpPr>
+          <p:cNvPr id="34" name="Gewinkelter Verbinder 33"/>
+          <p:cNvCxnSpPr>
+            <a:stCxn id="16" idx="0"/>
+            <a:endCxn id="12" idx="2"/>
+          </p:cNvCxnSpPr>
+          <p:nvPr/>
+        </p:nvCxnSpPr>
+        <p:spPr>
+          <a:xfrm rot="5400000" flipH="1" flipV="1">
+            <a:off x="7892648" y="3453282"/>
+            <a:ext cx="445190" cy="1050125"/>
+          </a:xfrm>
+          <a:prstGeom prst="bentConnector3">
+            <a:avLst>
+              <a:gd name="adj1" fmla="val 50000"/>
+            </a:avLst>
+          </a:prstGeom>
+          <a:ln w="12700">
+            <a:solidFill>
+              <a:schemeClr val="accent6"/>
+            </a:solidFill>
+          </a:ln>
+        </p:spPr>
+        <p:style>
+          <a:lnRef idx="1">
+            <a:schemeClr val="accent1"/>
+          </a:lnRef>
+          <a:fillRef idx="0">
+            <a:schemeClr val="accent1"/>
+          </a:fillRef>
+          <a:effectRef idx="0">
+            <a:schemeClr val="accent1"/>
+          </a:effectRef>
+          <a:fontRef idx="minor">
+            <a:schemeClr val="tx1"/>
+          </a:fontRef>
+        </p:style>
+      </p:cxnSp>
+      <p:cxnSp>
+        <p:nvCxnSpPr>
+          <p:cNvPr id="37" name="Gewinkelter Verbinder 36"/>
+          <p:cNvCxnSpPr>
+            <a:stCxn id="16" idx="0"/>
+            <a:endCxn id="15" idx="2"/>
+          </p:cNvCxnSpPr>
+          <p:nvPr/>
+        </p:nvCxnSpPr>
+        <p:spPr>
+          <a:xfrm rot="5400000" flipH="1" flipV="1">
+            <a:off x="8843492" y="2502438"/>
+            <a:ext cx="445190" cy="2951813"/>
+          </a:xfrm>
+          <a:prstGeom prst="bentConnector3">
+            <a:avLst>
+              <a:gd name="adj1" fmla="val 50000"/>
+            </a:avLst>
+          </a:prstGeom>
+          <a:ln w="12700">
+            <a:solidFill>
+              <a:schemeClr val="accent6"/>
+            </a:solidFill>
+          </a:ln>
+        </p:spPr>
+        <p:style>
+          <a:lnRef idx="1">
+            <a:schemeClr val="accent1"/>
+          </a:lnRef>
+          <a:fillRef idx="0">
+            <a:schemeClr val="accent1"/>
+          </a:fillRef>
+          <a:effectRef idx="0">
+            <a:schemeClr val="accent1"/>
+          </a:effectRef>
+          <a:fontRef idx="minor">
+            <a:schemeClr val="tx1"/>
+          </a:fontRef>
+        </p:style>
+      </p:cxnSp>
+      <p:cxnSp>
+        <p:nvCxnSpPr>
+          <p:cNvPr id="40" name="Gewinkelter Verbinder 39"/>
+          <p:cNvCxnSpPr>
+            <a:stCxn id="16" idx="0"/>
+            <a:endCxn id="32" idx="2"/>
+          </p:cNvCxnSpPr>
+          <p:nvPr/>
+        </p:nvCxnSpPr>
+        <p:spPr>
+          <a:xfrm rot="16200000" flipV="1">
+            <a:off x="6300726" y="2911484"/>
+            <a:ext cx="1615535" cy="963376"/>
+          </a:xfrm>
+          <a:prstGeom prst="bentConnector3">
+            <a:avLst>
+              <a:gd name="adj1" fmla="val 50000"/>
+            </a:avLst>
+          </a:prstGeom>
+          <a:ln w="12700">
+            <a:solidFill>
+              <a:schemeClr val="accent6"/>
+            </a:solidFill>
+          </a:ln>
+        </p:spPr>
+        <p:style>
+          <a:lnRef idx="1">
+            <a:schemeClr val="accent1"/>
+          </a:lnRef>
+          <a:fillRef idx="0">
+            <a:schemeClr val="accent1"/>
+          </a:fillRef>
+          <a:effectRef idx="0">
+            <a:schemeClr val="accent1"/>
+          </a:effectRef>
+          <a:fontRef idx="minor">
+            <a:schemeClr val="tx1"/>
+          </a:fontRef>
+        </p:style>
+      </p:cxnSp>
+      <p:cxnSp>
+        <p:nvCxnSpPr>
+          <p:cNvPr id="43" name="Gewinkelter Verbinder 42"/>
+          <p:cNvCxnSpPr>
+            <a:stCxn id="16" idx="1"/>
+            <a:endCxn id="27" idx="3"/>
+          </p:cNvCxnSpPr>
+          <p:nvPr/>
+        </p:nvCxnSpPr>
+        <p:spPr>
+          <a:xfrm rot="10800000">
+            <a:off x="3583995" y="897006"/>
+            <a:ext cx="199500" cy="3585543"/>
+          </a:xfrm>
+          <a:prstGeom prst="bentConnector3">
+            <a:avLst>
+              <a:gd name="adj1" fmla="val 50000"/>
+            </a:avLst>
+          </a:prstGeom>
+          <a:ln w="12700">
+            <a:solidFill>
+              <a:schemeClr val="accent6"/>
+            </a:solidFill>
+          </a:ln>
+        </p:spPr>
+        <p:style>
+          <a:lnRef idx="1">
+            <a:schemeClr val="accent1"/>
+          </a:lnRef>
+          <a:fillRef idx="0">
+            <a:schemeClr val="accent1"/>
+          </a:fillRef>
+          <a:effectRef idx="0">
+            <a:schemeClr val="accent1"/>
+          </a:effectRef>
+          <a:fontRef idx="minor">
+            <a:schemeClr val="tx1"/>
+          </a:fontRef>
+        </p:style>
+      </p:cxnSp>
+      <p:cxnSp>
+        <p:nvCxnSpPr>
+          <p:cNvPr id="47" name="Gewinkelter Verbinder 46"/>
+          <p:cNvCxnSpPr>
+            <a:stCxn id="4" idx="0"/>
+            <a:endCxn id="27" idx="1"/>
+          </p:cNvCxnSpPr>
+          <p:nvPr/>
+        </p:nvCxnSpPr>
+        <p:spPr>
+          <a:xfrm rot="5400000" flipH="1" flipV="1">
+            <a:off x="976781" y="1487293"/>
+            <a:ext cx="1434962" cy="254387"/>
+          </a:xfrm>
+          <a:prstGeom prst="bentConnector2">
+            <a:avLst/>
+          </a:prstGeom>
+          <a:ln w="12700">
+            <a:solidFill>
+              <a:schemeClr val="accent2"/>
+            </a:solidFill>
+          </a:ln>
+        </p:spPr>
+        <p:style>
+          <a:lnRef idx="1">
+            <a:schemeClr val="accent1"/>
+          </a:lnRef>
+          <a:fillRef idx="0">
+            <a:schemeClr val="accent1"/>
+          </a:fillRef>
+          <a:effectRef idx="0">
+            <a:schemeClr val="accent1"/>
+          </a:effectRef>
+          <a:fontRef idx="minor">
+            <a:schemeClr val="tx1"/>
+          </a:fontRef>
+        </p:style>
+      </p:cxnSp>
+    </p:spTree>
+    <p:extLst>
+      <p:ext uri="{BB962C8B-B14F-4D97-AF65-F5344CB8AC3E}">
+        <p14:creationId xmlns:p14="http://schemas.microsoft.com/office/powerpoint/2010/main" val="3071569064"/>
+      </p:ext>
+    </p:extLst>
+  </p:cSld>
+  <p:clrMapOvr>
+    <a:masterClrMapping/>
+  </p:clrMapOvr>
+  <p:timing>
+    <p:tnLst>
+      <p:par>
+        <p:cTn id="1" dur="indefinite" restart="never" nodeType="tmRoot">
+          <p:childTnLst>
+            <p:seq concurrent="1" nextAc="seek">
+              <p:cTn id="2" dur="indefinite" nodeType="mainSeq">
+                <p:childTnLst>
+                  <p:par>
+                    <p:cTn id="3" fill="hold">
+                      <p:stCondLst>
+                        <p:cond delay="indefinite"/>
+                      </p:stCondLst>
+                      <p:childTnLst>
+                        <p:par>
+                          <p:cTn id="4" fill="hold">
+                            <p:stCondLst>
+                              <p:cond delay="0"/>
+                            </p:stCondLst>
+                            <p:childTnLst>
+                              <p:par>
+                                <p:cTn id="5" presetID="1" presetClass="entr" presetSubtype="0" fill="hold" grpId="0" nodeType="clickEffect">
+                                  <p:stCondLst>
+                                    <p:cond delay="0"/>
+                                  </p:stCondLst>
+                                  <p:childTnLst>
+                                    <p:set>
+                                      <p:cBhvr>
+                                        <p:cTn id="6" dur="1" fill="hold">
+                                          <p:stCondLst>
+                                            <p:cond delay="0"/>
+                                          </p:stCondLst>
+                                        </p:cTn>
+                                        <p:tgtEl>
+                                          <p:spTgt spid="9"/>
+                                        </p:tgtEl>
+                                        <p:attrNameLst>
+                                          <p:attrName>style.visibility</p:attrName>
+                                        </p:attrNameLst>
+                                      </p:cBhvr>
+                                      <p:to>
+                                        <p:strVal val="visible"/>
+                                      </p:to>
+                                    </p:set>
+                                  </p:childTnLst>
+                                </p:cTn>
+                              </p:par>
+                            </p:childTnLst>
+                          </p:cTn>
+                        </p:par>
+                      </p:childTnLst>
+                    </p:cTn>
+                  </p:par>
+                  <p:par>
+                    <p:cTn id="7" fill="hold">
+                      <p:stCondLst>
+                        <p:cond delay="indefinite"/>
+                      </p:stCondLst>
+                      <p:childTnLst>
+                        <p:par>
+                          <p:cTn id="8" fill="hold">
+                            <p:stCondLst>
+                              <p:cond delay="0"/>
+                            </p:stCondLst>
+                            <p:childTnLst>
+                              <p:par>
+                                <p:cTn id="9" presetID="1" presetClass="entr" presetSubtype="0" fill="hold" grpId="0" nodeType="clickEffect">
+                                  <p:stCondLst>
+                                    <p:cond delay="0"/>
+                                  </p:stCondLst>
+                                  <p:childTnLst>
+                                    <p:set>
+                                      <p:cBhvr>
+                                        <p:cTn id="10" dur="1" fill="hold">
+                                          <p:stCondLst>
+                                            <p:cond delay="0"/>
+                                          </p:stCondLst>
+                                        </p:cTn>
+                                        <p:tgtEl>
+                                          <p:spTgt spid="17"/>
+                                        </p:tgtEl>
+                                        <p:attrNameLst>
+                                          <p:attrName>style.visibility</p:attrName>
+                                        </p:attrNameLst>
+                                      </p:cBhvr>
+                                      <p:to>
+                                        <p:strVal val="visible"/>
+                                      </p:to>
+                                    </p:set>
+                                  </p:childTnLst>
+                                </p:cTn>
+                              </p:par>
+                            </p:childTnLst>
+                          </p:cTn>
+                        </p:par>
+                      </p:childTnLst>
+                    </p:cTn>
+                  </p:par>
+                  <p:par>
+                    <p:cTn id="11" fill="hold">
+                      <p:stCondLst>
+                        <p:cond delay="indefinite"/>
+                      </p:stCondLst>
+                      <p:childTnLst>
+                        <p:par>
+                          <p:cTn id="12" fill="hold">
+                            <p:stCondLst>
+                              <p:cond delay="0"/>
+                            </p:stCondLst>
+                            <p:childTnLst>
+                              <p:par>
+                                <p:cTn id="13" presetID="1" presetClass="entr" presetSubtype="0" fill="hold" grpId="0" nodeType="clickEffect">
+                                  <p:stCondLst>
+                                    <p:cond delay="0"/>
+                                  </p:stCondLst>
+                                  <p:childTnLst>
+                                    <p:set>
+                                      <p:cBhvr>
+                                        <p:cTn id="14" dur="1" fill="hold">
+                                          <p:stCondLst>
+                                            <p:cond delay="0"/>
+                                          </p:stCondLst>
+                                        </p:cTn>
+                                        <p:tgtEl>
+                                          <p:spTgt spid="16"/>
+                                        </p:tgtEl>
+                                        <p:attrNameLst>
+                                          <p:attrName>style.visibility</p:attrName>
+                                        </p:attrNameLst>
+                                      </p:cBhvr>
+                                      <p:to>
+                                        <p:strVal val="visible"/>
+                                      </p:to>
+                                    </p:set>
+                                  </p:childTnLst>
+                                </p:cTn>
+                              </p:par>
+                            </p:childTnLst>
+                          </p:cTn>
+                        </p:par>
+                      </p:childTnLst>
+                    </p:cTn>
+                  </p:par>
+                  <p:par>
+                    <p:cTn id="15" fill="hold">
+                      <p:stCondLst>
+                        <p:cond delay="indefinite"/>
+                      </p:stCondLst>
+                      <p:childTnLst>
+                        <p:par>
+                          <p:cTn id="16" fill="hold">
+                            <p:stCondLst>
+                              <p:cond delay="0"/>
+                            </p:stCondLst>
+                            <p:childTnLst>
+                              <p:par>
+                                <p:cTn id="17" presetID="1" presetClass="entr" presetSubtype="0" fill="hold" grpId="0" nodeType="clickEffect">
+                                  <p:stCondLst>
+                                    <p:cond delay="0"/>
+                                  </p:stCondLst>
+                                  <p:childTnLst>
+                                    <p:set>
+                                      <p:cBhvr>
+                                        <p:cTn id="18" dur="1" fill="hold">
+                                          <p:stCondLst>
+                                            <p:cond delay="0"/>
+                                          </p:stCondLst>
+                                        </p:cTn>
+                                        <p:tgtEl>
+                                          <p:spTgt spid="18"/>
+                                        </p:tgtEl>
+                                        <p:attrNameLst>
+                                          <p:attrName>style.visibility</p:attrName>
+                                        </p:attrNameLst>
+                                      </p:cBhvr>
+                                      <p:to>
+                                        <p:strVal val="visible"/>
+                                      </p:to>
+                                    </p:set>
+                                  </p:childTnLst>
+                                </p:cTn>
+                              </p:par>
+                            </p:childTnLst>
+                          </p:cTn>
+                        </p:par>
+                      </p:childTnLst>
+                    </p:cTn>
+                  </p:par>
+                  <p:par>
+                    <p:cTn id="19" fill="hold">
+                      <p:stCondLst>
+                        <p:cond delay="indefinite"/>
+                      </p:stCondLst>
+                      <p:childTnLst>
+                        <p:par>
+                          <p:cTn id="20" fill="hold">
+                            <p:stCondLst>
+                              <p:cond delay="0"/>
+                            </p:stCondLst>
+                            <p:childTnLst>
+                              <p:par>
+                                <p:cTn id="21" presetID="1" presetClass="entr" presetSubtype="0" fill="hold" grpId="0" nodeType="clickEffect">
+                                  <p:stCondLst>
+                                    <p:cond delay="0"/>
+                                  </p:stCondLst>
+                                  <p:childTnLst>
+                                    <p:set>
+                                      <p:cBhvr>
+                                        <p:cTn id="22" dur="1" fill="hold">
+                                          <p:stCondLst>
+                                            <p:cond delay="0"/>
+                                          </p:stCondLst>
+                                        </p:cTn>
+                                        <p:tgtEl>
+                                          <p:spTgt spid="8"/>
+                                        </p:tgtEl>
+                                        <p:attrNameLst>
+                                          <p:attrName>style.visibility</p:attrName>
+                                        </p:attrNameLst>
+                                      </p:cBhvr>
+                                      <p:to>
+                                        <p:strVal val="visible"/>
+                                      </p:to>
+                                    </p:set>
+                                  </p:childTnLst>
+                                </p:cTn>
+                              </p:par>
+                            </p:childTnLst>
+                          </p:cTn>
+                        </p:par>
+                      </p:childTnLst>
+                    </p:cTn>
+                  </p:par>
+                  <p:par>
+                    <p:cTn id="23" fill="hold">
+                      <p:stCondLst>
+                        <p:cond delay="indefinite"/>
+                      </p:stCondLst>
+                      <p:childTnLst>
+                        <p:par>
+                          <p:cTn id="24" fill="hold">
+                            <p:stCondLst>
+                              <p:cond delay="0"/>
+                            </p:stCondLst>
+                            <p:childTnLst>
+                              <p:par>
+                                <p:cTn id="25" presetID="1" presetClass="entr" presetSubtype="0" fill="hold" grpId="0" nodeType="clickEffect">
+                                  <p:stCondLst>
+                                    <p:cond delay="0"/>
+                                  </p:stCondLst>
+                                  <p:childTnLst>
+                                    <p:set>
+                                      <p:cBhvr>
+                                        <p:cTn id="26" dur="1" fill="hold">
+                                          <p:stCondLst>
+                                            <p:cond delay="0"/>
+                                          </p:stCondLst>
+                                        </p:cTn>
+                                        <p:tgtEl>
+                                          <p:spTgt spid="4"/>
+                                        </p:tgtEl>
+                                        <p:attrNameLst>
+                                          <p:attrName>style.visibility</p:attrName>
+                                        </p:attrNameLst>
+                                      </p:cBhvr>
+                                      <p:to>
+                                        <p:strVal val="visible"/>
+                                      </p:to>
+                                    </p:set>
+                                  </p:childTnLst>
+                                </p:cTn>
+                              </p:par>
+                            </p:childTnLst>
+                          </p:cTn>
+                        </p:par>
+                      </p:childTnLst>
+                    </p:cTn>
+                  </p:par>
+                  <p:par>
+                    <p:cTn id="27" fill="hold">
+                      <p:stCondLst>
+                        <p:cond delay="indefinite"/>
+                      </p:stCondLst>
+                      <p:childTnLst>
+                        <p:par>
+                          <p:cTn id="28" fill="hold">
+                            <p:stCondLst>
+                              <p:cond delay="0"/>
+                            </p:stCondLst>
+                            <p:childTnLst>
+                              <p:par>
+                                <p:cTn id="29" presetID="1" presetClass="entr" presetSubtype="0" fill="hold" grpId="0" nodeType="clickEffect">
+                                  <p:stCondLst>
+                                    <p:cond delay="0"/>
+                                  </p:stCondLst>
+                                  <p:childTnLst>
+                                    <p:set>
+                                      <p:cBhvr>
+                                        <p:cTn id="30" dur="1" fill="hold">
+                                          <p:stCondLst>
+                                            <p:cond delay="0"/>
+                                          </p:stCondLst>
+                                        </p:cTn>
+                                        <p:tgtEl>
+                                          <p:spTgt spid="21"/>
+                                        </p:tgtEl>
+                                        <p:attrNameLst>
+                                          <p:attrName>style.visibility</p:attrName>
+                                        </p:attrNameLst>
+                                      </p:cBhvr>
+                                      <p:to>
+                                        <p:strVal val="visible"/>
+                                      </p:to>
+                                    </p:set>
+                                  </p:childTnLst>
+                                </p:cTn>
+                              </p:par>
+                            </p:childTnLst>
+                          </p:cTn>
+                        </p:par>
+                      </p:childTnLst>
+                    </p:cTn>
+                  </p:par>
+                  <p:par>
+                    <p:cTn id="31" fill="hold">
+                      <p:stCondLst>
+                        <p:cond delay="indefinite"/>
+                      </p:stCondLst>
+                      <p:childTnLst>
+                        <p:par>
+                          <p:cTn id="32" fill="hold">
+                            <p:stCondLst>
+                              <p:cond delay="0"/>
+                            </p:stCondLst>
+                            <p:childTnLst>
+                              <p:par>
+                                <p:cTn id="33" presetID="1" presetClass="entr" presetSubtype="0" fill="hold" grpId="0" nodeType="clickEffect">
+                                  <p:stCondLst>
+                                    <p:cond delay="0"/>
+                                  </p:stCondLst>
+                                  <p:childTnLst>
+                                    <p:set>
+                                      <p:cBhvr>
+                                        <p:cTn id="34" dur="1" fill="hold">
+                                          <p:stCondLst>
+                                            <p:cond delay="0"/>
+                                          </p:stCondLst>
+                                        </p:cTn>
+                                        <p:tgtEl>
+                                          <p:spTgt spid="22"/>
+                                        </p:tgtEl>
+                                        <p:attrNameLst>
+                                          <p:attrName>style.visibility</p:attrName>
+                                        </p:attrNameLst>
+                                      </p:cBhvr>
+                                      <p:to>
+                                        <p:strVal val="visible"/>
+                                      </p:to>
+                                    </p:set>
+                                  </p:childTnLst>
+                                </p:cTn>
+                              </p:par>
+                            </p:childTnLst>
+                          </p:cTn>
+                        </p:par>
+                      </p:childTnLst>
+                    </p:cTn>
+                  </p:par>
+                  <p:par>
+                    <p:cTn id="35" fill="hold">
+                      <p:stCondLst>
+                        <p:cond delay="indefinite"/>
+                      </p:stCondLst>
+                      <p:childTnLst>
+                        <p:par>
+                          <p:cTn id="36" fill="hold">
+                            <p:stCondLst>
+                              <p:cond delay="0"/>
+                            </p:stCondLst>
+                            <p:childTnLst>
+                              <p:par>
+                                <p:cTn id="37" presetID="1" presetClass="entr" presetSubtype="0" fill="hold" grpId="0" nodeType="clickEffect">
+                                  <p:stCondLst>
+                                    <p:cond delay="0"/>
+                                  </p:stCondLst>
+                                  <p:childTnLst>
+                                    <p:set>
+                                      <p:cBhvr>
+                                        <p:cTn id="38" dur="1" fill="hold">
+                                          <p:stCondLst>
+                                            <p:cond delay="0"/>
+                                          </p:stCondLst>
+                                        </p:cTn>
+                                        <p:tgtEl>
+                                          <p:spTgt spid="23"/>
+                                        </p:tgtEl>
+                                        <p:attrNameLst>
+                                          <p:attrName>style.visibility</p:attrName>
+                                        </p:attrNameLst>
+                                      </p:cBhvr>
+                                      <p:to>
+                                        <p:strVal val="visible"/>
+                                      </p:to>
+                                    </p:set>
+                                  </p:childTnLst>
+                                </p:cTn>
+                              </p:par>
+                            </p:childTnLst>
+                          </p:cTn>
+                        </p:par>
+                      </p:childTnLst>
+                    </p:cTn>
+                  </p:par>
+                  <p:par>
+                    <p:cTn id="39" fill="hold">
+                      <p:stCondLst>
+                        <p:cond delay="indefinite"/>
+                      </p:stCondLst>
+                      <p:childTnLst>
+                        <p:par>
+                          <p:cTn id="40" fill="hold">
+                            <p:stCondLst>
+                              <p:cond delay="0"/>
+                            </p:stCondLst>
+                            <p:childTnLst>
+                              <p:par>
+                                <p:cTn id="41" presetID="1" presetClass="entr" presetSubtype="0" fill="hold" grpId="0" nodeType="clickEffect">
+                                  <p:stCondLst>
+                                    <p:cond delay="0"/>
+                                  </p:stCondLst>
+                                  <p:childTnLst>
+                                    <p:set>
+                                      <p:cBhvr>
+                                        <p:cTn id="42" dur="1" fill="hold">
+                                          <p:stCondLst>
+                                            <p:cond delay="0"/>
+                                          </p:stCondLst>
+                                        </p:cTn>
+                                        <p:tgtEl>
+                                          <p:spTgt spid="10"/>
+                                        </p:tgtEl>
+                                        <p:attrNameLst>
+                                          <p:attrName>style.visibility</p:attrName>
+                                        </p:attrNameLst>
+                                      </p:cBhvr>
+                                      <p:to>
+                                        <p:strVal val="visible"/>
+                                      </p:to>
+                                    </p:set>
+                                  </p:childTnLst>
+                                </p:cTn>
+                              </p:par>
+                            </p:childTnLst>
+                          </p:cTn>
+                        </p:par>
+                      </p:childTnLst>
+                    </p:cTn>
+                  </p:par>
+                  <p:par>
+                    <p:cTn id="43" fill="hold">
+                      <p:stCondLst>
+                        <p:cond delay="indefinite"/>
+                      </p:stCondLst>
+                      <p:childTnLst>
+                        <p:par>
+                          <p:cTn id="44" fill="hold">
+                            <p:stCondLst>
+                              <p:cond delay="0"/>
+                            </p:stCondLst>
+                            <p:childTnLst>
+                              <p:par>
+                                <p:cTn id="45" presetID="1" presetClass="entr" presetSubtype="0" fill="hold" grpId="0" nodeType="clickEffect">
+                                  <p:stCondLst>
+                                    <p:cond delay="0"/>
+                                  </p:stCondLst>
+                                  <p:childTnLst>
+                                    <p:set>
+                                      <p:cBhvr>
+                                        <p:cTn id="46" dur="1" fill="hold">
+                                          <p:stCondLst>
+                                            <p:cond delay="0"/>
+                                          </p:stCondLst>
+                                        </p:cTn>
+                                        <p:tgtEl>
+                                          <p:spTgt spid="11"/>
+                                        </p:tgtEl>
+                                        <p:attrNameLst>
+                                          <p:attrName>style.visibility</p:attrName>
+                                        </p:attrNameLst>
+                                      </p:cBhvr>
+                                      <p:to>
+                                        <p:strVal val="visible"/>
+                                      </p:to>
+                                    </p:set>
+                                  </p:childTnLst>
+                                </p:cTn>
+                              </p:par>
+                            </p:childTnLst>
+                          </p:cTn>
+                        </p:par>
+                      </p:childTnLst>
+                    </p:cTn>
+                  </p:par>
+                  <p:par>
+                    <p:cTn id="47" fill="hold">
+                      <p:stCondLst>
+                        <p:cond delay="indefinite"/>
+                      </p:stCondLst>
+                      <p:childTnLst>
+                        <p:par>
+                          <p:cTn id="48" fill="hold">
+                            <p:stCondLst>
+                              <p:cond delay="0"/>
+                            </p:stCondLst>
+                            <p:childTnLst>
+                              <p:par>
+                                <p:cTn id="49" presetID="1" presetClass="entr" presetSubtype="0" fill="hold" grpId="0" nodeType="clickEffect">
+                                  <p:stCondLst>
+                                    <p:cond delay="0"/>
+                                  </p:stCondLst>
+                                  <p:childTnLst>
+                                    <p:set>
+                                      <p:cBhvr>
+                                        <p:cTn id="50" dur="1" fill="hold">
+                                          <p:stCondLst>
+                                            <p:cond delay="0"/>
+                                          </p:stCondLst>
+                                        </p:cTn>
+                                        <p:tgtEl>
+                                          <p:spTgt spid="12"/>
+                                        </p:tgtEl>
+                                        <p:attrNameLst>
+                                          <p:attrName>style.visibility</p:attrName>
+                                        </p:attrNameLst>
+                                      </p:cBhvr>
+                                      <p:to>
+                                        <p:strVal val="visible"/>
+                                      </p:to>
+                                    </p:set>
+                                  </p:childTnLst>
+                                </p:cTn>
+                              </p:par>
+                            </p:childTnLst>
+                          </p:cTn>
+                        </p:par>
+                      </p:childTnLst>
+                    </p:cTn>
+                  </p:par>
+                  <p:par>
+                    <p:cTn id="51" fill="hold">
+                      <p:stCondLst>
+                        <p:cond delay="indefinite"/>
+                      </p:stCondLst>
+                      <p:childTnLst>
+                        <p:par>
+                          <p:cTn id="52" fill="hold">
+                            <p:stCondLst>
+                              <p:cond delay="0"/>
+                            </p:stCondLst>
+                            <p:childTnLst>
+                              <p:par>
+                                <p:cTn id="53" presetID="1" presetClass="entr" presetSubtype="0" fill="hold" grpId="0" nodeType="clickEffect">
+                                  <p:stCondLst>
+                                    <p:cond delay="0"/>
+                                  </p:stCondLst>
+                                  <p:childTnLst>
+                                    <p:set>
+                                      <p:cBhvr>
+                                        <p:cTn id="54" dur="1" fill="hold">
+                                          <p:stCondLst>
+                                            <p:cond delay="0"/>
+                                          </p:stCondLst>
+                                        </p:cTn>
+                                        <p:tgtEl>
+                                          <p:spTgt spid="13"/>
+                                        </p:tgtEl>
+                                        <p:attrNameLst>
+                                          <p:attrName>style.visibility</p:attrName>
+                                        </p:attrNameLst>
+                                      </p:cBhvr>
+                                      <p:to>
+                                        <p:strVal val="visible"/>
+                                      </p:to>
+                                    </p:set>
+                                  </p:childTnLst>
+                                </p:cTn>
+                              </p:par>
+                            </p:childTnLst>
+                          </p:cTn>
+                        </p:par>
+                      </p:childTnLst>
+                    </p:cTn>
+                  </p:par>
+                  <p:par>
+                    <p:cTn id="55" fill="hold">
+                      <p:stCondLst>
+                        <p:cond delay="indefinite"/>
+                      </p:stCondLst>
+                      <p:childTnLst>
+                        <p:par>
+                          <p:cTn id="56" fill="hold">
+                            <p:stCondLst>
+                              <p:cond delay="0"/>
+                            </p:stCondLst>
+                            <p:childTnLst>
+                              <p:par>
+                                <p:cTn id="57" presetID="1" presetClass="entr" presetSubtype="0" fill="hold" grpId="0" nodeType="clickEffect">
+                                  <p:stCondLst>
+                                    <p:cond delay="0"/>
+                                  </p:stCondLst>
+                                  <p:childTnLst>
+                                    <p:set>
+                                      <p:cBhvr>
+                                        <p:cTn id="58" dur="1" fill="hold">
+                                          <p:stCondLst>
+                                            <p:cond delay="0"/>
+                                          </p:stCondLst>
+                                        </p:cTn>
+                                        <p:tgtEl>
+                                          <p:spTgt spid="14"/>
+                                        </p:tgtEl>
+                                        <p:attrNameLst>
+                                          <p:attrName>style.visibility</p:attrName>
+                                        </p:attrNameLst>
+                                      </p:cBhvr>
+                                      <p:to>
+                                        <p:strVal val="visible"/>
+                                      </p:to>
+                                    </p:set>
+                                  </p:childTnLst>
+                                </p:cTn>
+                              </p:par>
+                            </p:childTnLst>
+                          </p:cTn>
+                        </p:par>
+                      </p:childTnLst>
+                    </p:cTn>
+                  </p:par>
+                  <p:par>
+                    <p:cTn id="59" fill="hold">
+                      <p:stCondLst>
+                        <p:cond delay="indefinite"/>
+                      </p:stCondLst>
+                      <p:childTnLst>
+                        <p:par>
+                          <p:cTn id="60" fill="hold">
+                            <p:stCondLst>
+                              <p:cond delay="0"/>
+                            </p:stCondLst>
+                            <p:childTnLst>
+                              <p:par>
+                                <p:cTn id="61" presetID="1" presetClass="entr" presetSubtype="0" fill="hold" grpId="0" nodeType="clickEffect">
+                                  <p:stCondLst>
+                                    <p:cond delay="0"/>
+                                  </p:stCondLst>
+                                  <p:childTnLst>
+                                    <p:set>
+                                      <p:cBhvr>
+                                        <p:cTn id="62" dur="1" fill="hold">
+                                          <p:stCondLst>
+                                            <p:cond delay="0"/>
+                                          </p:stCondLst>
+                                        </p:cTn>
+                                        <p:tgtEl>
+                                          <p:spTgt spid="15"/>
+                                        </p:tgtEl>
+                                        <p:attrNameLst>
+                                          <p:attrName>style.visibility</p:attrName>
+                                        </p:attrNameLst>
+                                      </p:cBhvr>
+                                      <p:to>
+                                        <p:strVal val="visible"/>
+                                      </p:to>
+                                    </p:set>
+                                  </p:childTnLst>
+                                </p:cTn>
+                              </p:par>
+                            </p:childTnLst>
+                          </p:cTn>
+                        </p:par>
+                      </p:childTnLst>
+                    </p:cTn>
+                  </p:par>
+                  <p:par>
+                    <p:cTn id="63" fill="hold">
+                      <p:stCondLst>
+                        <p:cond delay="indefinite"/>
+                      </p:stCondLst>
+                      <p:childTnLst>
+                        <p:par>
+                          <p:cTn id="64" fill="hold">
+                            <p:stCondLst>
+                              <p:cond delay="0"/>
+                            </p:stCondLst>
+                            <p:childTnLst>
+                              <p:par>
+                                <p:cTn id="65" presetID="1" presetClass="entr" presetSubtype="0" fill="hold" grpId="0" nodeType="clickEffect">
+                                  <p:stCondLst>
+                                    <p:cond delay="0"/>
+                                  </p:stCondLst>
+                                  <p:childTnLst>
+                                    <p:set>
+                                      <p:cBhvr>
+                                        <p:cTn id="66" dur="1" fill="hold">
+                                          <p:stCondLst>
+                                            <p:cond delay="0"/>
+                                          </p:stCondLst>
+                                        </p:cTn>
+                                        <p:tgtEl>
+                                          <p:spTgt spid="32"/>
+                                        </p:tgtEl>
+                                        <p:attrNameLst>
+                                          <p:attrName>style.visibility</p:attrName>
+                                        </p:attrNameLst>
+                                      </p:cBhvr>
+                                      <p:to>
+                                        <p:strVal val="visible"/>
+                                      </p:to>
+                                    </p:set>
+                                  </p:childTnLst>
+                                </p:cTn>
+                              </p:par>
+                            </p:childTnLst>
+                          </p:cTn>
+                        </p:par>
+                      </p:childTnLst>
+                    </p:cTn>
+                  </p:par>
+                  <p:par>
+                    <p:cTn id="67" fill="hold">
+                      <p:stCondLst>
+                        <p:cond delay="indefinite"/>
+                      </p:stCondLst>
+                      <p:childTnLst>
+                        <p:par>
+                          <p:cTn id="68" fill="hold">
+                            <p:stCondLst>
+                              <p:cond delay="0"/>
+                            </p:stCondLst>
+                            <p:childTnLst>
+                              <p:par>
+                                <p:cTn id="69" presetID="1" presetClass="entr" presetSubtype="0" fill="hold" grpId="0" nodeType="clickEffect">
+                                  <p:stCondLst>
+                                    <p:cond delay="0"/>
+                                  </p:stCondLst>
+                                  <p:childTnLst>
+                                    <p:set>
+                                      <p:cBhvr>
+                                        <p:cTn id="70" dur="1" fill="hold">
+                                          <p:stCondLst>
+                                            <p:cond delay="0"/>
+                                          </p:stCondLst>
+                                        </p:cTn>
+                                        <p:tgtEl>
+                                          <p:spTgt spid="27"/>
+                                        </p:tgtEl>
+                                        <p:attrNameLst>
+                                          <p:attrName>style.visibility</p:attrName>
+                                        </p:attrNameLst>
+                                      </p:cBhvr>
+                                      <p:to>
+                                        <p:strVal val="visible"/>
+                                      </p:to>
+                                    </p:set>
+                                  </p:childTnLst>
+                                </p:cTn>
+                              </p:par>
+                            </p:childTnLst>
+                          </p:cTn>
+                        </p:par>
+                      </p:childTnLst>
+                    </p:cTn>
+                  </p:par>
+                </p:childTnLst>
+              </p:cTn>
+              <p:prevCondLst>
+                <p:cond evt="onPrev" delay="0">
+                  <p:tgtEl>
+                    <p:sldTgt/>
+                  </p:tgtEl>
+                </p:cond>
+              </p:prevCondLst>
+              <p:nextCondLst>
+                <p:cond evt="onNext" delay="0">
+                  <p:tgtEl>
+                    <p:sldTgt/>
+                  </p:tgtEl>
+                </p:cond>
+              </p:nextCondLst>
+            </p:seq>
+          </p:childTnLst>
+        </p:cTn>
+      </p:par>
+    </p:tnLst>
+    <p:bldLst>
+      <p:bldP spid="8" grpId="0" animBg="1"/>
+      <p:bldP spid="9" grpId="0" animBg="1"/>
+      <p:bldP spid="10" grpId="0" animBg="1"/>
+      <p:bldP spid="11" grpId="0" animBg="1"/>
+      <p:bldP spid="12" grpId="0" animBg="1"/>
+      <p:bldP spid="13" grpId="0" animBg="1"/>
+      <p:bldP spid="14" grpId="0" animBg="1"/>
+      <p:bldP spid="15" grpId="0" animBg="1"/>
+      <p:bldP spid="16" grpId="0" animBg="1"/>
+      <p:bldP spid="17" grpId="0" animBg="1"/>
+      <p:bldP spid="18" grpId="0" animBg="1"/>
+      <p:bldP spid="21" grpId="0" animBg="1"/>
+      <p:bldP spid="22" grpId="0" animBg="1"/>
+      <p:bldP spid="23" grpId="0" animBg="1"/>
+      <p:bldP spid="32" grpId="0" animBg="1"/>
+      <p:bldP spid="4" grpId="0" animBg="1"/>
+      <p:bldP spid="27" grpId="0" animBg="1"/>
+    </p:bldLst>
+  </p:timing>
+</p:sld>
+</file>
+
 <file path=ppt/theme/theme1.xml><?xml version="1.0" encoding="utf-8"?>
 <a:theme xmlns:a="http://schemas.openxmlformats.org/drawingml/2006/main" name="Office">
   <a:themeElements>

</xml_diff>

<commit_message>
Drei Netzwerke, Router-VM, etc.
</commit_message>
<xml_diff>
--- a/Architecture-Overview.pptx
+++ b/Architecture-Overview.pptx
@@ -6,6 +6,7 @@
   </p:sldMasterIdLst>
   <p:sldIdLst>
     <p:sldId id="256" r:id="rId2"/>
+    <p:sldId id="257" r:id="rId3"/>
   </p:sldIdLst>
   <p:sldSz cx="12192000" cy="6858000"/>
   <p:notesSz cx="6858000" cy="9144000"/>
@@ -243,7 +244,7 @@
           <a:p>
             <a:fld id="{FB965CEE-315E-405C-BA70-ED45D4E0DFFE}" type="datetimeFigureOut">
               <a:rPr lang="de-DE" smtClean="0"/>
-              <a:t>18.12.2020</a:t>
+              <a:t>22.01.2021</a:t>
             </a:fld>
             <a:endParaRPr lang="de-DE"/>
           </a:p>
@@ -413,7 +414,7 @@
           <a:p>
             <a:fld id="{FB965CEE-315E-405C-BA70-ED45D4E0DFFE}" type="datetimeFigureOut">
               <a:rPr lang="de-DE" smtClean="0"/>
-              <a:t>18.12.2020</a:t>
+              <a:t>22.01.2021</a:t>
             </a:fld>
             <a:endParaRPr lang="de-DE"/>
           </a:p>
@@ -593,7 +594,7 @@
           <a:p>
             <a:fld id="{FB965CEE-315E-405C-BA70-ED45D4E0DFFE}" type="datetimeFigureOut">
               <a:rPr lang="de-DE" smtClean="0"/>
-              <a:t>18.12.2020</a:t>
+              <a:t>22.01.2021</a:t>
             </a:fld>
             <a:endParaRPr lang="de-DE"/>
           </a:p>
@@ -763,7 +764,7 @@
           <a:p>
             <a:fld id="{FB965CEE-315E-405C-BA70-ED45D4E0DFFE}" type="datetimeFigureOut">
               <a:rPr lang="de-DE" smtClean="0"/>
-              <a:t>18.12.2020</a:t>
+              <a:t>22.01.2021</a:t>
             </a:fld>
             <a:endParaRPr lang="de-DE"/>
           </a:p>
@@ -1009,7 +1010,7 @@
           <a:p>
             <a:fld id="{FB965CEE-315E-405C-BA70-ED45D4E0DFFE}" type="datetimeFigureOut">
               <a:rPr lang="de-DE" smtClean="0"/>
-              <a:t>18.12.2020</a:t>
+              <a:t>22.01.2021</a:t>
             </a:fld>
             <a:endParaRPr lang="de-DE"/>
           </a:p>
@@ -1241,7 +1242,7 @@
           <a:p>
             <a:fld id="{FB965CEE-315E-405C-BA70-ED45D4E0DFFE}" type="datetimeFigureOut">
               <a:rPr lang="de-DE" smtClean="0"/>
-              <a:t>18.12.2020</a:t>
+              <a:t>22.01.2021</a:t>
             </a:fld>
             <a:endParaRPr lang="de-DE"/>
           </a:p>
@@ -1608,7 +1609,7 @@
           <a:p>
             <a:fld id="{FB965CEE-315E-405C-BA70-ED45D4E0DFFE}" type="datetimeFigureOut">
               <a:rPr lang="de-DE" smtClean="0"/>
-              <a:t>18.12.2020</a:t>
+              <a:t>22.01.2021</a:t>
             </a:fld>
             <a:endParaRPr lang="de-DE"/>
           </a:p>
@@ -1726,7 +1727,7 @@
           <a:p>
             <a:fld id="{FB965CEE-315E-405C-BA70-ED45D4E0DFFE}" type="datetimeFigureOut">
               <a:rPr lang="de-DE" smtClean="0"/>
-              <a:t>18.12.2020</a:t>
+              <a:t>22.01.2021</a:t>
             </a:fld>
             <a:endParaRPr lang="de-DE"/>
           </a:p>
@@ -1821,7 +1822,7 @@
           <a:p>
             <a:fld id="{FB965CEE-315E-405C-BA70-ED45D4E0DFFE}" type="datetimeFigureOut">
               <a:rPr lang="de-DE" smtClean="0"/>
-              <a:t>18.12.2020</a:t>
+              <a:t>22.01.2021</a:t>
             </a:fld>
             <a:endParaRPr lang="de-DE"/>
           </a:p>
@@ -2098,7 +2099,7 @@
           <a:p>
             <a:fld id="{FB965CEE-315E-405C-BA70-ED45D4E0DFFE}" type="datetimeFigureOut">
               <a:rPr lang="de-DE" smtClean="0"/>
-              <a:t>18.12.2020</a:t>
+              <a:t>22.01.2021</a:t>
             </a:fld>
             <a:endParaRPr lang="de-DE"/>
           </a:p>
@@ -2351,7 +2352,7 @@
           <a:p>
             <a:fld id="{FB965CEE-315E-405C-BA70-ED45D4E0DFFE}" type="datetimeFigureOut">
               <a:rPr lang="de-DE" smtClean="0"/>
-              <a:t>18.12.2020</a:t>
+              <a:t>22.01.2021</a:t>
             </a:fld>
             <a:endParaRPr lang="de-DE"/>
           </a:p>
@@ -2564,7 +2565,7 @@
           <a:p>
             <a:fld id="{FB965CEE-315E-405C-BA70-ED45D4E0DFFE}" type="datetimeFigureOut">
               <a:rPr lang="de-DE" smtClean="0"/>
-              <a:t>18.12.2020</a:t>
+              <a:t>22.01.2021</a:t>
             </a:fld>
             <a:endParaRPr lang="de-DE"/>
           </a:p>
@@ -2977,8 +2978,8 @@
         </p:nvSpPr>
         <p:spPr>
           <a:xfrm>
-            <a:off x="689111" y="2966830"/>
-            <a:ext cx="1762539" cy="1033670"/>
+            <a:off x="452176" y="4994130"/>
+            <a:ext cx="1999473" cy="429512"/>
           </a:xfrm>
           <a:prstGeom prst="rect">
             <a:avLst/>
@@ -3006,21 +3007,18 @@
           <a:p>
             <a:pPr algn="ctr"/>
             <a:r>
-              <a:rPr lang="de-DE" dirty="0" err="1" smtClean="0"/>
+              <a:rPr lang="de-DE" sz="1400" dirty="0" err="1" smtClean="0"/>
               <a:t>Install</a:t>
             </a:r>
             <a:r>
-              <a:rPr lang="de-DE" dirty="0" smtClean="0"/>
-              <a:t> VM</a:t>
-            </a:r>
-          </a:p>
-          <a:p>
-            <a:pPr algn="ctr"/>
-            <a:r>
-              <a:rPr lang="de-DE" dirty="0" smtClean="0"/>
-              <a:t>Notebook</a:t>
-            </a:r>
-            <a:endParaRPr lang="de-DE" dirty="0"/>
+              <a:rPr lang="de-DE" sz="1400" dirty="0" smtClean="0"/>
+              <a:t> </a:t>
+            </a:r>
+            <a:r>
+              <a:rPr lang="de-DE" sz="1400" dirty="0" smtClean="0"/>
+              <a:t>VM</a:t>
+            </a:r>
+            <a:endParaRPr lang="de-DE" sz="1400" dirty="0" smtClean="0"/>
           </a:p>
         </p:txBody>
       </p:sp>
@@ -3032,8 +3030,8 @@
         </p:nvSpPr>
         <p:spPr>
           <a:xfrm>
-            <a:off x="2789583" y="225288"/>
-            <a:ext cx="9011478" cy="4764156"/>
+            <a:off x="7375491" y="3295859"/>
+            <a:ext cx="4425570" cy="2793441"/>
           </a:xfrm>
           <a:prstGeom prst="rect">
             <a:avLst/>
@@ -3060,11 +3058,23 @@
           </a:fontRef>
         </p:style>
         <p:txBody>
-          <a:bodyPr rtlCol="0" anchor="ctr"/>
+          <a:bodyPr rtlCol="0" anchor="t"/>
           <a:lstStyle/>
           <a:p>
             <a:pPr algn="ctr"/>
-            <a:endParaRPr lang="de-DE"/>
+            <a:r>
+              <a:rPr lang="de-DE" dirty="0" err="1" smtClean="0">
+                <a:solidFill>
+                  <a:schemeClr val="tx1"/>
+                </a:solidFill>
+              </a:rPr>
+              <a:t>openshift.local</a:t>
+            </a:r>
+            <a:endParaRPr lang="de-DE" dirty="0">
+              <a:solidFill>
+                <a:schemeClr val="tx1"/>
+              </a:solidFill>
+            </a:endParaRPr>
           </a:p>
         </p:txBody>
       </p:sp>
@@ -3076,8 +3086,8 @@
         </p:nvSpPr>
         <p:spPr>
           <a:xfrm>
-            <a:off x="278296" y="5189883"/>
-            <a:ext cx="11522765" cy="1033670"/>
+            <a:off x="278296" y="6252540"/>
+            <a:ext cx="11522765" cy="489502"/>
           </a:xfrm>
           <a:prstGeom prst="rect">
             <a:avLst/>
@@ -3132,8 +3142,8 @@
         </p:nvSpPr>
         <p:spPr>
           <a:xfrm>
-            <a:off x="5817703" y="380170"/>
-            <a:ext cx="1762539" cy="1033670"/>
+            <a:off x="9051487" y="3706855"/>
+            <a:ext cx="1168555" cy="519404"/>
           </a:xfrm>
           <a:prstGeom prst="rect">
             <a:avLst/>
@@ -3159,15 +3169,20 @@
           </a:fontRef>
         </p:style>
         <p:txBody>
-          <a:bodyPr rtlCol="0" anchor="ctr"/>
-          <a:lstStyle/>
-          <a:p>
-            <a:pPr algn="ctr"/>
-            <a:r>
-              <a:rPr lang="de-DE" dirty="0" smtClean="0"/>
+          <a:bodyPr rtlCol="0" anchor="t"/>
+          <a:lstStyle/>
+          <a:p>
+            <a:r>
+              <a:rPr lang="de-DE" sz="1400" dirty="0" smtClean="0"/>
               <a:t>Master#1</a:t>
             </a:r>
-            <a:endParaRPr lang="de-DE" dirty="0"/>
+          </a:p>
+          <a:p>
+            <a:r>
+              <a:rPr lang="de-DE" sz="1400" dirty="0" smtClean="0"/>
+              <a:t>11.11.11.121</a:t>
+            </a:r>
+            <a:endParaRPr lang="de-DE" sz="1400" dirty="0"/>
           </a:p>
         </p:txBody>
       </p:sp>
@@ -3179,8 +3194,8 @@
         </p:nvSpPr>
         <p:spPr>
           <a:xfrm>
-            <a:off x="5817703" y="1533939"/>
-            <a:ext cx="1762539" cy="1033670"/>
+            <a:off x="9051487" y="4307879"/>
+            <a:ext cx="1168555" cy="519404"/>
           </a:xfrm>
           <a:prstGeom prst="rect">
             <a:avLst/>
@@ -3206,15 +3221,20 @@
           </a:fontRef>
         </p:style>
         <p:txBody>
-          <a:bodyPr rtlCol="0" anchor="ctr"/>
-          <a:lstStyle/>
-          <a:p>
-            <a:pPr algn="ctr"/>
-            <a:r>
-              <a:rPr lang="de-DE" dirty="0" smtClean="0"/>
+          <a:bodyPr rtlCol="0" anchor="t"/>
+          <a:lstStyle/>
+          <a:p>
+            <a:r>
+              <a:rPr lang="de-DE" sz="1400" dirty="0" smtClean="0"/>
               <a:t>Master#2</a:t>
             </a:r>
-            <a:endParaRPr lang="de-DE" dirty="0"/>
+          </a:p>
+          <a:p>
+            <a:r>
+              <a:rPr lang="de-DE" sz="1400" dirty="0" smtClean="0"/>
+              <a:t>11.11.11.122</a:t>
+            </a:r>
+            <a:endParaRPr lang="de-DE" sz="1400" dirty="0"/>
           </a:p>
         </p:txBody>
       </p:sp>
@@ -3226,8 +3246,8 @@
         </p:nvSpPr>
         <p:spPr>
           <a:xfrm>
-            <a:off x="5817700" y="2722079"/>
-            <a:ext cx="1762539" cy="1033670"/>
+            <a:off x="9051488" y="4908903"/>
+            <a:ext cx="1168555" cy="519404"/>
           </a:xfrm>
           <a:prstGeom prst="rect">
             <a:avLst/>
@@ -3253,15 +3273,20 @@
           </a:fontRef>
         </p:style>
         <p:txBody>
-          <a:bodyPr rtlCol="0" anchor="ctr"/>
-          <a:lstStyle/>
-          <a:p>
-            <a:pPr algn="ctr"/>
-            <a:r>
-              <a:rPr lang="de-DE" dirty="0" smtClean="0"/>
+          <a:bodyPr rtlCol="0" anchor="t"/>
+          <a:lstStyle/>
+          <a:p>
+            <a:r>
+              <a:rPr lang="de-DE" sz="1400" dirty="0" smtClean="0"/>
               <a:t>Master#3</a:t>
             </a:r>
-            <a:endParaRPr lang="de-DE" dirty="0"/>
+          </a:p>
+          <a:p>
+            <a:r>
+              <a:rPr lang="de-DE" sz="1400" dirty="0" smtClean="0"/>
+              <a:t>11.11.11.123</a:t>
+            </a:r>
+            <a:endParaRPr lang="de-DE" sz="1400" dirty="0"/>
           </a:p>
         </p:txBody>
       </p:sp>
@@ -3273,8 +3298,8 @@
         </p:nvSpPr>
         <p:spPr>
           <a:xfrm>
-            <a:off x="7719389" y="380170"/>
-            <a:ext cx="1762539" cy="1033670"/>
+            <a:off x="10372443" y="3702191"/>
+            <a:ext cx="1168555" cy="519404"/>
           </a:xfrm>
           <a:prstGeom prst="rect">
             <a:avLst/>
@@ -3300,15 +3325,20 @@
           </a:fontRef>
         </p:style>
         <p:txBody>
-          <a:bodyPr rtlCol="0" anchor="ctr"/>
-          <a:lstStyle/>
-          <a:p>
-            <a:pPr algn="ctr"/>
-            <a:r>
-              <a:rPr lang="de-DE" dirty="0" smtClean="0"/>
+          <a:bodyPr rtlCol="0" anchor="t"/>
+          <a:lstStyle/>
+          <a:p>
+            <a:r>
+              <a:rPr lang="de-DE" sz="1400" dirty="0" smtClean="0"/>
               <a:t>Worker#1</a:t>
             </a:r>
-            <a:endParaRPr lang="de-DE" dirty="0"/>
+          </a:p>
+          <a:p>
+            <a:r>
+              <a:rPr lang="de-DE" sz="1400" dirty="0" smtClean="0"/>
+              <a:t>11.11.11.124</a:t>
+            </a:r>
+            <a:endParaRPr lang="de-DE" sz="1400" dirty="0"/>
           </a:p>
         </p:txBody>
       </p:sp>
@@ -3320,8 +3350,8 @@
         </p:nvSpPr>
         <p:spPr>
           <a:xfrm>
-            <a:off x="7719389" y="1533939"/>
-            <a:ext cx="1762539" cy="1033670"/>
+            <a:off x="10372444" y="4303215"/>
+            <a:ext cx="1168555" cy="519404"/>
           </a:xfrm>
           <a:prstGeom prst="rect">
             <a:avLst/>
@@ -3347,15 +3377,20 @@
           </a:fontRef>
         </p:style>
         <p:txBody>
-          <a:bodyPr rtlCol="0" anchor="ctr"/>
-          <a:lstStyle/>
-          <a:p>
-            <a:pPr algn="ctr"/>
-            <a:r>
-              <a:rPr lang="de-DE" dirty="0" smtClean="0"/>
+          <a:bodyPr rtlCol="0" anchor="t"/>
+          <a:lstStyle/>
+          <a:p>
+            <a:r>
+              <a:rPr lang="de-DE" sz="1400" dirty="0" smtClean="0"/>
               <a:t>Worker#2</a:t>
             </a:r>
-            <a:endParaRPr lang="de-DE" dirty="0"/>
+          </a:p>
+          <a:p>
+            <a:r>
+              <a:rPr lang="de-DE" sz="1400" dirty="0" smtClean="0"/>
+              <a:t>11.11.11.125</a:t>
+            </a:r>
+            <a:endParaRPr lang="de-DE" sz="1400" dirty="0"/>
           </a:p>
         </p:txBody>
       </p:sp>
@@ -3367,8 +3402,8 @@
         </p:nvSpPr>
         <p:spPr>
           <a:xfrm>
-            <a:off x="7719388" y="2722079"/>
-            <a:ext cx="1762539" cy="1033670"/>
+            <a:off x="10372445" y="4904239"/>
+            <a:ext cx="1168555" cy="519404"/>
           </a:xfrm>
           <a:prstGeom prst="rect">
             <a:avLst/>
@@ -3394,15 +3429,20 @@
           </a:fontRef>
         </p:style>
         <p:txBody>
-          <a:bodyPr rtlCol="0" anchor="ctr"/>
-          <a:lstStyle/>
-          <a:p>
-            <a:pPr algn="ctr"/>
-            <a:r>
-              <a:rPr lang="de-DE" dirty="0" smtClean="0"/>
+          <a:bodyPr rtlCol="0" anchor="t"/>
+          <a:lstStyle/>
+          <a:p>
+            <a:r>
+              <a:rPr lang="de-DE" sz="1400" dirty="0" smtClean="0"/>
               <a:t>Worker#3</a:t>
             </a:r>
-            <a:endParaRPr lang="de-DE" dirty="0"/>
+          </a:p>
+          <a:p>
+            <a:r>
+              <a:rPr lang="de-DE" sz="1400" dirty="0" smtClean="0"/>
+              <a:t>11.11.11.126</a:t>
+            </a:r>
+            <a:endParaRPr lang="de-DE" sz="1400" dirty="0"/>
           </a:p>
         </p:txBody>
       </p:sp>
@@ -3414,8 +3454,8 @@
         </p:nvSpPr>
         <p:spPr>
           <a:xfrm>
-            <a:off x="3180521" y="4200939"/>
-            <a:ext cx="8328991" cy="563218"/>
+            <a:off x="7611586" y="5586883"/>
+            <a:ext cx="3929413" cy="379079"/>
           </a:xfrm>
           <a:prstGeom prst="rect">
             <a:avLst/>
@@ -3443,10 +3483,14 @@
           <a:p>
             <a:pPr algn="ctr"/>
             <a:r>
-              <a:rPr lang="de-DE" dirty="0" smtClean="0"/>
-              <a:t>Internal Network 192.168.111.0/26</a:t>
-            </a:r>
-            <a:endParaRPr lang="de-DE" dirty="0"/>
+              <a:rPr lang="de-DE" sz="1400" dirty="0" smtClean="0"/>
+              <a:t>Internal Network </a:t>
+            </a:r>
+            <a:r>
+              <a:rPr lang="de-DE" sz="1400" dirty="0" smtClean="0"/>
+              <a:t>11.11.11.0/24</a:t>
+            </a:r>
+            <a:endParaRPr lang="de-DE" sz="1400" dirty="0"/>
           </a:p>
         </p:txBody>
       </p:sp>
@@ -3458,8 +3502,8 @@
         </p:nvSpPr>
         <p:spPr>
           <a:xfrm>
-            <a:off x="689112" y="4200939"/>
-            <a:ext cx="1762539" cy="563218"/>
+            <a:off x="452176" y="5586882"/>
+            <a:ext cx="1999473" cy="379079"/>
           </a:xfrm>
           <a:prstGeom prst="rect">
             <a:avLst/>
@@ -3506,8 +3550,8 @@
         </p:nvSpPr>
         <p:spPr>
           <a:xfrm>
-            <a:off x="278296" y="225288"/>
-            <a:ext cx="2358887" cy="4764156"/>
+            <a:off x="278296" y="2763297"/>
+            <a:ext cx="2358887" cy="3326002"/>
           </a:xfrm>
           <a:prstGeom prst="rect">
             <a:avLst/>
@@ -3553,58 +3597,16 @@
         </p:nvSpPr>
         <p:spPr>
           <a:xfrm>
-            <a:off x="1832114" y="1079224"/>
-            <a:ext cx="1762539" cy="1033670"/>
-          </a:xfrm>
-          <a:prstGeom prst="rect">
-            <a:avLst/>
-          </a:prstGeom>
-        </p:spPr>
-        <p:style>
-          <a:lnRef idx="2">
-            <a:schemeClr val="accent1">
-              <a:shade val="50000"/>
-            </a:schemeClr>
-          </a:lnRef>
-          <a:fillRef idx="1">
-            <a:schemeClr val="accent1"/>
-          </a:fillRef>
-          <a:effectRef idx="0">
-            <a:schemeClr val="accent1"/>
-          </a:effectRef>
-          <a:fontRef idx="minor">
-            <a:schemeClr val="lt1"/>
-          </a:fontRef>
-        </p:style>
-        <p:txBody>
-          <a:bodyPr rtlCol="0" anchor="ctr"/>
-          <a:lstStyle/>
-          <a:p>
-            <a:pPr algn="ctr"/>
-            <a:r>
-              <a:rPr lang="de-DE" dirty="0" smtClean="0"/>
-              <a:t>Router-VM</a:t>
-            </a:r>
-            <a:endParaRPr lang="de-DE" dirty="0"/>
-          </a:p>
-        </p:txBody>
-      </p:sp>
-      <p:sp>
-        <p:nvSpPr>
-          <p:cNvPr id="20" name="Rechteck 19"/>
-          <p:cNvSpPr/>
-          <p:nvPr/>
-        </p:nvSpPr>
-        <p:spPr>
-          <a:xfrm>
-            <a:off x="9634328" y="380170"/>
-            <a:ext cx="1762539" cy="1033670"/>
+            <a:off x="452175" y="3001963"/>
+            <a:ext cx="1999473" cy="1027426"/>
           </a:xfrm>
           <a:prstGeom prst="rect">
             <a:avLst/>
           </a:prstGeom>
           <a:solidFill>
-            <a:schemeClr val="accent2"/>
+            <a:schemeClr val="accent2">
+              <a:lumMod val="75000"/>
+            </a:schemeClr>
           </a:solidFill>
         </p:spPr>
         <p:style>
@@ -3624,15 +3626,32 @@
           </a:fontRef>
         </p:style>
         <p:txBody>
-          <a:bodyPr rtlCol="0" anchor="ctr"/>
-          <a:lstStyle/>
-          <a:p>
-            <a:pPr algn="ctr"/>
-            <a:r>
-              <a:rPr lang="de-DE" dirty="0" smtClean="0"/>
-              <a:t>Worker#4</a:t>
-            </a:r>
-            <a:endParaRPr lang="de-DE" dirty="0"/>
+          <a:bodyPr rtlCol="0" anchor="t"/>
+          <a:lstStyle/>
+          <a:p>
+            <a:r>
+              <a:rPr lang="de-DE" sz="1400" dirty="0" smtClean="0"/>
+              <a:t>Router-VM</a:t>
+            </a:r>
+          </a:p>
+          <a:p>
+            <a:r>
+              <a:rPr lang="de-DE" sz="1400" dirty="0" smtClean="0"/>
+              <a:t>10.0.249.94/24</a:t>
+            </a:r>
+          </a:p>
+          <a:p>
+            <a:r>
+              <a:rPr lang="de-DE" sz="1400" dirty="0" smtClean="0"/>
+              <a:t>11.11.11.1/24</a:t>
+            </a:r>
+          </a:p>
+          <a:p>
+            <a:r>
+              <a:rPr lang="de-DE" sz="1400" dirty="0" smtClean="0"/>
+              <a:t>11.11.10.1/24</a:t>
+            </a:r>
+            <a:endParaRPr lang="de-DE" sz="1400" dirty="0"/>
           </a:p>
         </p:txBody>
       </p:sp>
@@ -3644,8 +3663,8 @@
         </p:nvSpPr>
         <p:spPr>
           <a:xfrm>
-            <a:off x="3783495" y="1537666"/>
-            <a:ext cx="1762539" cy="1033670"/>
+            <a:off x="7611586" y="4303214"/>
+            <a:ext cx="1287499" cy="532193"/>
           </a:xfrm>
           <a:prstGeom prst="rect">
             <a:avLst/>
@@ -3671,15 +3690,24 @@
           </a:fontRef>
         </p:style>
         <p:txBody>
-          <a:bodyPr rtlCol="0" anchor="ctr"/>
-          <a:lstStyle/>
-          <a:p>
-            <a:pPr algn="ctr"/>
-            <a:r>
-              <a:rPr lang="de-DE" dirty="0" smtClean="0"/>
-              <a:t>Bastion Host</a:t>
-            </a:r>
-            <a:endParaRPr lang="de-DE" dirty="0"/>
+          <a:bodyPr rtlCol="0" anchor="t"/>
+          <a:lstStyle/>
+          <a:p>
+            <a:r>
+              <a:rPr lang="de-DE" sz="1400" dirty="0" smtClean="0"/>
+              <a:t>Bastion </a:t>
+            </a:r>
+            <a:r>
+              <a:rPr lang="de-DE" sz="1400" dirty="0" smtClean="0"/>
+              <a:t>Host</a:t>
+            </a:r>
+          </a:p>
+          <a:p>
+            <a:r>
+              <a:rPr lang="de-DE" sz="1400" dirty="0" smtClean="0"/>
+              <a:t>11.11.11.120</a:t>
+            </a:r>
+            <a:endParaRPr lang="de-DE" sz="1400" dirty="0"/>
           </a:p>
         </p:txBody>
       </p:sp>
@@ -3691,8 +3719,8 @@
         </p:nvSpPr>
         <p:spPr>
           <a:xfrm>
-            <a:off x="3776871" y="380170"/>
-            <a:ext cx="1762539" cy="1033670"/>
+            <a:off x="4906621" y="753895"/>
+            <a:ext cx="1999473" cy="777542"/>
           </a:xfrm>
           <a:prstGeom prst="rect">
             <a:avLst/>
@@ -3718,15 +3746,29 @@
           </a:fontRef>
         </p:style>
         <p:txBody>
-          <a:bodyPr rtlCol="0" anchor="ctr"/>
-          <a:lstStyle/>
-          <a:p>
-            <a:pPr algn="ctr"/>
-            <a:r>
-              <a:rPr lang="de-DE" dirty="0" smtClean="0"/>
+          <a:bodyPr rtlCol="0" anchor="t"/>
+          <a:lstStyle/>
+          <a:p>
+            <a:r>
+              <a:rPr lang="de-DE" sz="1100" dirty="0" smtClean="0"/>
               <a:t>Registry</a:t>
             </a:r>
-            <a:endParaRPr lang="de-DE" dirty="0"/>
+          </a:p>
+          <a:p>
+            <a:r>
+              <a:rPr lang="de-DE" sz="1100" dirty="0" smtClean="0"/>
+              <a:t>11.11.10.10/24</a:t>
+            </a:r>
+            <a:endParaRPr lang="de-DE" sz="1100" dirty="0"/>
+          </a:p>
+          <a:p>
+            <a:r>
+              <a:rPr lang="de-DE" sz="1100" dirty="0" smtClean="0"/>
+              <a:t>GW: 11.11.10.1</a:t>
+            </a:r>
+          </a:p>
+          <a:p>
+            <a:endParaRPr lang="de-DE" sz="1100" dirty="0" smtClean="0"/>
           </a:p>
         </p:txBody>
       </p:sp>
@@ -3738,8 +3780,8 @@
         </p:nvSpPr>
         <p:spPr>
           <a:xfrm>
-            <a:off x="3776870" y="2722079"/>
-            <a:ext cx="1762539" cy="1033670"/>
+            <a:off x="7611587" y="4904239"/>
+            <a:ext cx="1287499" cy="519404"/>
           </a:xfrm>
           <a:prstGeom prst="rect">
             <a:avLst/>
@@ -3765,39 +3807,46 @@
           </a:fontRef>
         </p:style>
         <p:txBody>
-          <a:bodyPr rtlCol="0" anchor="ctr"/>
-          <a:lstStyle/>
-          <a:p>
-            <a:pPr algn="ctr"/>
-            <a:r>
-              <a:rPr lang="de-DE" dirty="0" smtClean="0"/>
+          <a:bodyPr rtlCol="0" anchor="t"/>
+          <a:lstStyle/>
+          <a:p>
+            <a:r>
+              <a:rPr lang="de-DE" sz="1400" dirty="0" smtClean="0"/>
               <a:t>Load-</a:t>
             </a:r>
             <a:r>
-              <a:rPr lang="de-DE" dirty="0" err="1" smtClean="0"/>
+              <a:rPr lang="de-DE" sz="1400" dirty="0" err="1" smtClean="0"/>
               <a:t>Balancer</a:t>
             </a:r>
-            <a:endParaRPr lang="de-DE" dirty="0"/>
-          </a:p>
-        </p:txBody>
-      </p:sp>
-      <p:sp>
-        <p:nvSpPr>
-          <p:cNvPr id="31" name="Rechteck 30"/>
+            <a:endParaRPr lang="de-DE" sz="1400" dirty="0" smtClean="0"/>
+          </a:p>
+          <a:p>
+            <a:r>
+              <a:rPr lang="de-DE" sz="1400" dirty="0" smtClean="0"/>
+              <a:t>11.11.11.129</a:t>
+            </a:r>
+            <a:endParaRPr lang="de-DE" sz="1400" dirty="0"/>
+          </a:p>
+        </p:txBody>
+      </p:sp>
+      <p:sp>
+        <p:nvSpPr>
+          <p:cNvPr id="24" name="Rechteck 23"/>
           <p:cNvSpPr/>
           <p:nvPr/>
         </p:nvSpPr>
         <p:spPr>
           <a:xfrm>
-            <a:off x="9634327" y="1533939"/>
-            <a:ext cx="1762539" cy="1033670"/>
+            <a:off x="4749083" y="377950"/>
+            <a:ext cx="2358887" cy="1802542"/>
           </a:xfrm>
           <a:prstGeom prst="rect">
             <a:avLst/>
           </a:prstGeom>
-          <a:solidFill>
-            <a:schemeClr val="accent2"/>
-          </a:solidFill>
+          <a:noFill/>
+          <a:ln>
+            <a:prstDash val="dash"/>
+          </a:ln>
         </p:spPr>
         <p:style>
           <a:lnRef idx="2">
@@ -3816,47 +3865,63 @@
           </a:fontRef>
         </p:style>
         <p:txBody>
-          <a:bodyPr rtlCol="0" anchor="ctr"/>
+          <a:bodyPr rtlCol="0" anchor="t"/>
           <a:lstStyle/>
           <a:p>
             <a:pPr algn="ctr"/>
             <a:r>
-              <a:rPr lang="de-DE" dirty="0" smtClean="0"/>
-              <a:t>Worker#5</a:t>
-            </a:r>
-            <a:endParaRPr lang="de-DE" dirty="0"/>
-          </a:p>
-        </p:txBody>
-      </p:sp>
-      <p:sp>
-        <p:nvSpPr>
-          <p:cNvPr id="32" name="Rechteck 31"/>
+              <a:rPr lang="de-DE" dirty="0" err="1" smtClean="0">
+                <a:solidFill>
+                  <a:schemeClr val="tx1"/>
+                </a:solidFill>
+              </a:rPr>
+              <a:t>registry.</a:t>
+            </a:r>
+            <a:r>
+              <a:rPr lang="de-DE" dirty="0" err="1" smtClean="0">
+                <a:solidFill>
+                  <a:schemeClr val="tx1"/>
+                </a:solidFill>
+              </a:rPr>
+              <a:t>local</a:t>
+            </a:r>
+            <a:endParaRPr lang="de-DE" dirty="0">
+              <a:solidFill>
+                <a:schemeClr val="tx1"/>
+              </a:solidFill>
+            </a:endParaRPr>
+          </a:p>
+        </p:txBody>
+      </p:sp>
+      <p:sp>
+        <p:nvSpPr>
+          <p:cNvPr id="25" name="Rechteck 24"/>
           <p:cNvSpPr/>
           <p:nvPr/>
         </p:nvSpPr>
         <p:spPr>
           <a:xfrm>
-            <a:off x="9634327" y="2722079"/>
-            <a:ext cx="1762539" cy="1033670"/>
+            <a:off x="4906621" y="1654775"/>
+            <a:ext cx="1999473" cy="379079"/>
           </a:xfrm>
           <a:prstGeom prst="rect">
             <a:avLst/>
           </a:prstGeom>
           <a:solidFill>
-            <a:schemeClr val="accent2"/>
+            <a:srgbClr val="7030A0"/>
           </a:solidFill>
         </p:spPr>
         <p:style>
           <a:lnRef idx="2">
-            <a:schemeClr val="accent1">
+            <a:schemeClr val="accent2">
               <a:shade val="50000"/>
             </a:schemeClr>
           </a:lnRef>
           <a:fillRef idx="1">
-            <a:schemeClr val="accent1"/>
+            <a:schemeClr val="accent2"/>
           </a:fillRef>
           <a:effectRef idx="0">
-            <a:schemeClr val="accent1"/>
+            <a:schemeClr val="accent2"/>
           </a:effectRef>
           <a:fontRef idx="minor">
             <a:schemeClr val="lt1"/>
@@ -3868,10 +3933,22 @@
           <a:p>
             <a:pPr algn="ctr"/>
             <a:r>
-              <a:rPr lang="de-DE" dirty="0" smtClean="0"/>
-              <a:t>Worker#6</a:t>
-            </a:r>
-            <a:endParaRPr lang="de-DE" dirty="0"/>
+              <a:rPr lang="de-DE" sz="1200" dirty="0" smtClean="0"/>
+              <a:t>Internal </a:t>
+            </a:r>
+            <a:r>
+              <a:rPr lang="de-DE" sz="1200" dirty="0" smtClean="0"/>
+              <a:t>Network </a:t>
+            </a:r>
+            <a:r>
+              <a:rPr lang="de-DE" sz="1200" dirty="0" err="1" smtClean="0"/>
+              <a:t>for</a:t>
+            </a:r>
+            <a:r>
+              <a:rPr lang="de-DE" sz="1200" dirty="0" smtClean="0"/>
+              <a:t> Registry 11.11.10.0/24</a:t>
+            </a:r>
+            <a:endParaRPr lang="de-DE" sz="1200" dirty="0"/>
           </a:p>
         </p:txBody>
       </p:sp>
@@ -4594,7 +4671,7 @@
                                           </p:stCondLst>
                                         </p:cTn>
                                         <p:tgtEl>
-                                          <p:spTgt spid="20"/>
+                                          <p:spTgt spid="19"/>
                                         </p:tgtEl>
                                         <p:attrNameLst>
                                           <p:attrName>style.visibility</p:attrName>
@@ -4639,7 +4716,7 @@
                                           </p:stCondLst>
                                         </p:cTn>
                                         <p:tgtEl>
-                                          <p:spTgt spid="31"/>
+                                          <p:spTgt spid="24"/>
                                         </p:tgtEl>
                                         <p:attrNameLst>
                                           <p:attrName>style.visibility</p:attrName>
@@ -4684,52 +4761,7 @@
                                           </p:stCondLst>
                                         </p:cTn>
                                         <p:tgtEl>
-                                          <p:spTgt spid="32"/>
-                                        </p:tgtEl>
-                                        <p:attrNameLst>
-                                          <p:attrName>style.visibility</p:attrName>
-                                        </p:attrNameLst>
-                                      </p:cBhvr>
-                                      <p:to>
-                                        <p:strVal val="visible"/>
-                                      </p:to>
-                                    </p:set>
-                                  </p:childTnLst>
-                                </p:cTn>
-                              </p:par>
-                            </p:childTnLst>
-                          </p:cTn>
-                        </p:par>
-                      </p:childTnLst>
-                    </p:cTn>
-                  </p:par>
-                  <p:par>
-                    <p:cTn id="75" fill="hold">
-                      <p:stCondLst>
-                        <p:cond delay="indefinite"/>
-                      </p:stCondLst>
-                      <p:childTnLst>
-                        <p:par>
-                          <p:cTn id="76" fill="hold">
-                            <p:stCondLst>
-                              <p:cond delay="0"/>
-                            </p:stCondLst>
-                            <p:childTnLst>
-                              <p:par>
-                                <p:cTn id="77" presetID="1" presetClass="entr" presetSubtype="0" fill="hold" grpId="0" nodeType="clickEffect">
-                                  <p:stCondLst>
-                                    <p:cond delay="0"/>
-                                  </p:stCondLst>
-                                  <p:childTnLst>
-                                    <p:set>
-                                      <p:cBhvr>
-                                        <p:cTn id="78" dur="1" fill="hold">
-                                          <p:stCondLst>
-                                            <p:cond delay="0"/>
-                                          </p:stCondLst>
-                                        </p:cTn>
-                                        <p:tgtEl>
-                                          <p:spTgt spid="19"/>
+                                          <p:spTgt spid="25"/>
                                         </p:tgtEl>
                                         <p:attrNameLst>
                                           <p:attrName>style.visibility</p:attrName>
@@ -4783,13 +4815,1021 @@
       <p:bldP spid="17" grpId="0" animBg="1"/>
       <p:bldP spid="18" grpId="0" animBg="1"/>
       <p:bldP spid="19" grpId="0" animBg="1"/>
-      <p:bldP spid="20" grpId="0" animBg="1"/>
       <p:bldP spid="21" grpId="0" animBg="1"/>
       <p:bldP spid="22" grpId="0" animBg="1"/>
       <p:bldP spid="23" grpId="0" animBg="1"/>
-      <p:bldP spid="31" grpId="0" animBg="1"/>
-      <p:bldP spid="32" grpId="0" animBg="1"/>
+      <p:bldP spid="24" grpId="0" animBg="1"/>
+      <p:bldP spid="25" grpId="0" animBg="1"/>
     </p:bldLst>
+  </p:timing>
+</p:sld>
+</file>
+
+<file path=ppt/slides/slide2.xml><?xml version="1.0" encoding="utf-8"?>
+<p:sld xmlns:a="http://schemas.openxmlformats.org/drawingml/2006/main" xmlns:r="http://schemas.openxmlformats.org/officeDocument/2006/relationships" xmlns:p="http://schemas.openxmlformats.org/presentationml/2006/main">
+  <p:cSld>
+    <p:spTree>
+      <p:nvGrpSpPr>
+        <p:cNvPr id="1" name=""/>
+        <p:cNvGrpSpPr/>
+        <p:nvPr/>
+      </p:nvGrpSpPr>
+      <p:grpSpPr>
+        <a:xfrm>
+          <a:off x="0" y="0"/>
+          <a:ext cx="0" cy="0"/>
+          <a:chOff x="0" y="0"/>
+          <a:chExt cx="0" cy="0"/>
+        </a:xfrm>
+      </p:grpSpPr>
+      <p:graphicFrame>
+        <p:nvGraphicFramePr>
+          <p:cNvPr id="5" name="Tabelle 4"/>
+          <p:cNvGraphicFramePr>
+            <a:graphicFrameLocks noGrp="1"/>
+          </p:cNvGraphicFramePr>
+          <p:nvPr>
+            <p:extLst>
+              <p:ext uri="{D42A27DB-BD31-4B8C-83A1-F6EECF244321}">
+                <p14:modId xmlns:p14="http://schemas.microsoft.com/office/powerpoint/2010/main" val="4048129413"/>
+              </p:ext>
+            </p:extLst>
+          </p:nvPr>
+        </p:nvGraphicFramePr>
+        <p:xfrm>
+          <a:off x="223294" y="247394"/>
+          <a:ext cx="11422747" cy="6489576"/>
+        </p:xfrm>
+        <a:graphic>
+          <a:graphicData uri="http://schemas.openxmlformats.org/drawingml/2006/table">
+            <a:tbl>
+              <a:tblPr firstRow="1" bandRow="1">
+                <a:tableStyleId>{5C22544A-7EE6-4342-B048-85BDC9FD1C3A}</a:tableStyleId>
+              </a:tblPr>
+              <a:tblGrid>
+                <a:gridCol w="1789161">
+                  <a:extLst>
+                    <a:ext uri="{9D8B030D-6E8A-4147-A177-3AD203B41FA5}">
+                      <a16:colId xmlns:a16="http://schemas.microsoft.com/office/drawing/2014/main" val="674962493"/>
+                    </a:ext>
+                  </a:extLst>
+                </a:gridCol>
+                <a:gridCol w="4066798">
+                  <a:extLst>
+                    <a:ext uri="{9D8B030D-6E8A-4147-A177-3AD203B41FA5}">
+                      <a16:colId xmlns:a16="http://schemas.microsoft.com/office/drawing/2014/main" val="3488339607"/>
+                    </a:ext>
+                  </a:extLst>
+                </a:gridCol>
+                <a:gridCol w="2692958">
+                  <a:extLst>
+                    <a:ext uri="{9D8B030D-6E8A-4147-A177-3AD203B41FA5}">
+                      <a16:colId xmlns:a16="http://schemas.microsoft.com/office/drawing/2014/main" val="2204301085"/>
+                    </a:ext>
+                  </a:extLst>
+                </a:gridCol>
+                <a:gridCol w="2873830">
+                  <a:extLst>
+                    <a:ext uri="{9D8B030D-6E8A-4147-A177-3AD203B41FA5}">
+                      <a16:colId xmlns:a16="http://schemas.microsoft.com/office/drawing/2014/main" val="4098244152"/>
+                    </a:ext>
+                  </a:extLst>
+                </a:gridCol>
+              </a:tblGrid>
+              <a:tr h="436584">
+                <a:tc>
+                  <a:txBody>
+                    <a:bodyPr/>
+                    <a:lstStyle/>
+                    <a:p>
+                      <a:r>
+                        <a:rPr lang="de-DE" dirty="0" smtClean="0"/>
+                        <a:t>Rolle</a:t>
+                      </a:r>
+                      <a:endParaRPr lang="de-DE" dirty="0"/>
+                    </a:p>
+                  </a:txBody>
+                  <a:tcPr/>
+                </a:tc>
+                <a:tc>
+                  <a:txBody>
+                    <a:bodyPr/>
+                    <a:lstStyle/>
+                    <a:p>
+                      <a:r>
+                        <a:rPr lang="de-DE" dirty="0" smtClean="0"/>
+                        <a:t>Beschreibung</a:t>
+                      </a:r>
+                      <a:endParaRPr lang="de-DE" dirty="0"/>
+                    </a:p>
+                  </a:txBody>
+                  <a:tcPr/>
+                </a:tc>
+                <a:tc>
+                  <a:txBody>
+                    <a:bodyPr/>
+                    <a:lstStyle/>
+                    <a:p>
+                      <a:r>
+                        <a:rPr lang="de-DE" dirty="0" smtClean="0"/>
+                        <a:t>Hostname</a:t>
+                      </a:r>
+                      <a:endParaRPr lang="de-DE" dirty="0"/>
+                    </a:p>
+                  </a:txBody>
+                  <a:tcPr/>
+                </a:tc>
+                <a:tc>
+                  <a:txBody>
+                    <a:bodyPr/>
+                    <a:lstStyle/>
+                    <a:p>
+                      <a:r>
+                        <a:rPr lang="de-DE" dirty="0" smtClean="0"/>
+                        <a:t>IP</a:t>
+                      </a:r>
+                      <a:endParaRPr lang="de-DE" dirty="0"/>
+                    </a:p>
+                  </a:txBody>
+                  <a:tcPr/>
+                </a:tc>
+                <a:extLst>
+                  <a:ext uri="{0D108BD9-81ED-4DB2-BD59-A6C34878D82A}">
+                    <a16:rowId xmlns:a16="http://schemas.microsoft.com/office/drawing/2014/main" val="4165280786"/>
+                  </a:ext>
+                </a:extLst>
+              </a:tr>
+              <a:tr h="436584">
+                <a:tc>
+                  <a:txBody>
+                    <a:bodyPr/>
+                    <a:lstStyle/>
+                    <a:p>
+                      <a:r>
+                        <a:rPr lang="de-DE" dirty="0" err="1" smtClean="0"/>
+                        <a:t>Install</a:t>
+                      </a:r>
+                      <a:r>
+                        <a:rPr lang="de-DE" dirty="0" smtClean="0"/>
+                        <a:t>-VM</a:t>
+                      </a:r>
+                      <a:endParaRPr lang="de-DE" dirty="0"/>
+                    </a:p>
+                  </a:txBody>
+                  <a:tcPr/>
+                </a:tc>
+                <a:tc>
+                  <a:txBody>
+                    <a:bodyPr/>
+                    <a:lstStyle/>
+                    <a:p>
+                      <a:endParaRPr lang="de-DE" dirty="0"/>
+                    </a:p>
+                  </a:txBody>
+                  <a:tcPr/>
+                </a:tc>
+                <a:tc>
+                  <a:txBody>
+                    <a:bodyPr/>
+                    <a:lstStyle/>
+                    <a:p>
+                      <a:r>
+                        <a:rPr lang="de-DE" dirty="0" err="1" smtClean="0"/>
+                        <a:t>install-vm</a:t>
+                      </a:r>
+                      <a:endParaRPr lang="de-DE" dirty="0"/>
+                    </a:p>
+                  </a:txBody>
+                  <a:tcPr/>
+                </a:tc>
+                <a:tc>
+                  <a:txBody>
+                    <a:bodyPr/>
+                    <a:lstStyle/>
+                    <a:p>
+                      <a:r>
+                        <a:rPr lang="de-DE" dirty="0" smtClean="0"/>
+                        <a:t>10.0.249.113</a:t>
+                      </a:r>
+                      <a:endParaRPr lang="de-DE" dirty="0"/>
+                    </a:p>
+                  </a:txBody>
+                  <a:tcPr/>
+                </a:tc>
+                <a:extLst>
+                  <a:ext uri="{0D108BD9-81ED-4DB2-BD59-A6C34878D82A}">
+                    <a16:rowId xmlns:a16="http://schemas.microsoft.com/office/drawing/2014/main" val="3300308436"/>
+                  </a:ext>
+                </a:extLst>
+              </a:tr>
+              <a:tr h="436584">
+                <a:tc>
+                  <a:txBody>
+                    <a:bodyPr/>
+                    <a:lstStyle/>
+                    <a:p>
+                      <a:r>
+                        <a:rPr lang="de-DE" dirty="0" smtClean="0"/>
+                        <a:t>Router</a:t>
+                      </a:r>
+                      <a:endParaRPr lang="de-DE" dirty="0"/>
+                    </a:p>
+                  </a:txBody>
+                  <a:tcPr/>
+                </a:tc>
+                <a:tc>
+                  <a:txBody>
+                    <a:bodyPr/>
+                    <a:lstStyle/>
+                    <a:p>
+                      <a:r>
+                        <a:rPr lang="de-DE" dirty="0" smtClean="0"/>
+                        <a:t>Router-VM zur Navigation zwischen den Netzwerken in </a:t>
+                      </a:r>
+                      <a:r>
+                        <a:rPr lang="de-DE" dirty="0" err="1" smtClean="0"/>
+                        <a:t>Vmware</a:t>
+                      </a:r>
+                      <a:endParaRPr lang="de-DE" dirty="0"/>
+                    </a:p>
+                  </a:txBody>
+                  <a:tcPr/>
+                </a:tc>
+                <a:tc>
+                  <a:txBody>
+                    <a:bodyPr/>
+                    <a:lstStyle/>
+                    <a:p>
+                      <a:r>
+                        <a:rPr lang="de-DE" dirty="0" err="1" smtClean="0"/>
+                        <a:t>router</a:t>
+                      </a:r>
+                      <a:endParaRPr lang="de-DE" dirty="0"/>
+                    </a:p>
+                  </a:txBody>
+                  <a:tcPr/>
+                </a:tc>
+                <a:tc>
+                  <a:txBody>
+                    <a:bodyPr/>
+                    <a:lstStyle/>
+                    <a:p>
+                      <a:r>
+                        <a:rPr lang="de-DE" dirty="0" smtClean="0"/>
+                        <a:t>11.11.11.1</a:t>
+                      </a:r>
+                      <a:br>
+                        <a:rPr lang="de-DE" dirty="0" smtClean="0"/>
+                      </a:br>
+                      <a:r>
+                        <a:rPr lang="de-DE" dirty="0" smtClean="0"/>
+                        <a:t>10.0.249.2</a:t>
+                      </a:r>
+                      <a:endParaRPr lang="de-DE" dirty="0"/>
+                    </a:p>
+                  </a:txBody>
+                  <a:tcPr/>
+                </a:tc>
+                <a:extLst>
+                  <a:ext uri="{0D108BD9-81ED-4DB2-BD59-A6C34878D82A}">
+                    <a16:rowId xmlns:a16="http://schemas.microsoft.com/office/drawing/2014/main" val="1923464837"/>
+                  </a:ext>
+                </a:extLst>
+              </a:tr>
+              <a:tr h="436584">
+                <a:tc>
+                  <a:txBody>
+                    <a:bodyPr/>
+                    <a:lstStyle/>
+                    <a:p>
+                      <a:r>
+                        <a:rPr lang="de-DE" dirty="0" smtClean="0"/>
+                        <a:t>Registry</a:t>
+                      </a:r>
+                      <a:endParaRPr lang="de-DE" dirty="0"/>
+                    </a:p>
+                  </a:txBody>
+                  <a:tcPr/>
+                </a:tc>
+                <a:tc>
+                  <a:txBody>
+                    <a:bodyPr/>
+                    <a:lstStyle/>
+                    <a:p>
+                      <a:r>
+                        <a:rPr lang="de-DE" dirty="0" smtClean="0"/>
+                        <a:t>Die zentrale</a:t>
+                      </a:r>
+                      <a:r>
+                        <a:rPr lang="de-DE" baseline="0" dirty="0" smtClean="0"/>
+                        <a:t> Image-Registry</a:t>
+                      </a:r>
+                      <a:endParaRPr lang="de-DE" dirty="0"/>
+                    </a:p>
+                  </a:txBody>
+                  <a:tcPr/>
+                </a:tc>
+                <a:tc>
+                  <a:txBody>
+                    <a:bodyPr/>
+                    <a:lstStyle/>
+                    <a:p>
+                      <a:r>
+                        <a:rPr lang="de-DE" dirty="0" smtClean="0"/>
+                        <a:t>ocpregistry01</a:t>
+                      </a:r>
+                      <a:endParaRPr lang="de-DE" dirty="0"/>
+                    </a:p>
+                  </a:txBody>
+                  <a:tcPr/>
+                </a:tc>
+                <a:tc>
+                  <a:txBody>
+                    <a:bodyPr/>
+                    <a:lstStyle/>
+                    <a:p>
+                      <a:r>
+                        <a:rPr lang="de-DE" dirty="0" smtClean="0"/>
+                        <a:t>11.11.11.2</a:t>
+                      </a:r>
+                      <a:endParaRPr lang="de-DE" dirty="0"/>
+                    </a:p>
+                  </a:txBody>
+                  <a:tcPr/>
+                </a:tc>
+                <a:extLst>
+                  <a:ext uri="{0D108BD9-81ED-4DB2-BD59-A6C34878D82A}">
+                    <a16:rowId xmlns:a16="http://schemas.microsoft.com/office/drawing/2014/main" val="1742835167"/>
+                  </a:ext>
+                </a:extLst>
+              </a:tr>
+              <a:tr h="436584">
+                <a:tc>
+                  <a:txBody>
+                    <a:bodyPr/>
+                    <a:lstStyle/>
+                    <a:p>
+                      <a:r>
+                        <a:rPr lang="de-DE" dirty="0" smtClean="0"/>
+                        <a:t>Load </a:t>
+                      </a:r>
+                      <a:r>
+                        <a:rPr lang="de-DE" dirty="0" err="1" smtClean="0"/>
+                        <a:t>Balancer</a:t>
+                      </a:r>
+                      <a:endParaRPr lang="de-DE" dirty="0"/>
+                    </a:p>
+                  </a:txBody>
+                  <a:tcPr/>
+                </a:tc>
+                <a:tc>
+                  <a:txBody>
+                    <a:bodyPr/>
+                    <a:lstStyle/>
+                    <a:p>
+                      <a:r>
+                        <a:rPr lang="de-DE" dirty="0" smtClean="0"/>
+                        <a:t>Der Load-</a:t>
+                      </a:r>
+                      <a:r>
+                        <a:rPr lang="de-DE" dirty="0" err="1" smtClean="0"/>
+                        <a:t>Balancer</a:t>
+                      </a:r>
+                      <a:r>
+                        <a:rPr lang="de-DE" dirty="0" smtClean="0"/>
+                        <a:t> vor dem </a:t>
+                      </a:r>
+                      <a:r>
+                        <a:rPr lang="de-DE" dirty="0" err="1" smtClean="0"/>
+                        <a:t>OpenShift</a:t>
+                      </a:r>
+                      <a:r>
+                        <a:rPr lang="de-DE" dirty="0" smtClean="0"/>
+                        <a:t>-Cluster</a:t>
+                      </a:r>
+                      <a:endParaRPr lang="de-DE" dirty="0"/>
+                    </a:p>
+                  </a:txBody>
+                  <a:tcPr/>
+                </a:tc>
+                <a:tc>
+                  <a:txBody>
+                    <a:bodyPr/>
+                    <a:lstStyle/>
+                    <a:p>
+                      <a:r>
+                        <a:rPr lang="de-DE" dirty="0" smtClean="0"/>
+                        <a:t>ocplb01</a:t>
+                      </a:r>
+                      <a:endParaRPr lang="de-DE" dirty="0"/>
+                    </a:p>
+                  </a:txBody>
+                  <a:tcPr/>
+                </a:tc>
+                <a:tc>
+                  <a:txBody>
+                    <a:bodyPr/>
+                    <a:lstStyle/>
+                    <a:p>
+                      <a:r>
+                        <a:rPr lang="de-DE" dirty="0" smtClean="0"/>
+                        <a:t>11.11.11.3</a:t>
+                      </a:r>
+                      <a:endParaRPr lang="de-DE" dirty="0"/>
+                    </a:p>
+                  </a:txBody>
+                  <a:tcPr/>
+                </a:tc>
+                <a:extLst>
+                  <a:ext uri="{0D108BD9-81ED-4DB2-BD59-A6C34878D82A}">
+                    <a16:rowId xmlns:a16="http://schemas.microsoft.com/office/drawing/2014/main" val="26461902"/>
+                  </a:ext>
+                </a:extLst>
+              </a:tr>
+              <a:tr h="436584">
+                <a:tc>
+                  <a:txBody>
+                    <a:bodyPr/>
+                    <a:lstStyle/>
+                    <a:p>
+                      <a:r>
+                        <a:rPr lang="de-DE" dirty="0" smtClean="0"/>
+                        <a:t>Bastion-Host</a:t>
+                      </a:r>
+                      <a:endParaRPr lang="de-DE" dirty="0"/>
+                    </a:p>
+                  </a:txBody>
+                  <a:tcPr/>
+                </a:tc>
+                <a:tc>
+                  <a:txBody>
+                    <a:bodyPr/>
+                    <a:lstStyle/>
+                    <a:p>
+                      <a:r>
+                        <a:rPr lang="de-DE" dirty="0" smtClean="0"/>
+                        <a:t>Der zentrale</a:t>
+                      </a:r>
+                      <a:r>
+                        <a:rPr lang="de-DE" baseline="0" dirty="0" smtClean="0"/>
+                        <a:t> </a:t>
+                      </a:r>
+                      <a:r>
+                        <a:rPr lang="de-DE" baseline="0" dirty="0" err="1" smtClean="0"/>
+                        <a:t>OpenShift</a:t>
+                      </a:r>
+                      <a:r>
+                        <a:rPr lang="de-DE" baseline="0" smtClean="0"/>
+                        <a:t>-Installationsserver mit DNS, DHCP, PXE, TFTP, NFS</a:t>
+                      </a:r>
+                      <a:endParaRPr lang="de-DE" dirty="0"/>
+                    </a:p>
+                  </a:txBody>
+                  <a:tcPr/>
+                </a:tc>
+                <a:tc>
+                  <a:txBody>
+                    <a:bodyPr/>
+                    <a:lstStyle/>
+                    <a:p>
+                      <a:r>
+                        <a:rPr lang="de-DE" dirty="0" err="1" smtClean="0"/>
+                        <a:t>ocpbastion</a:t>
+                      </a:r>
+                      <a:endParaRPr lang="de-DE" dirty="0"/>
+                    </a:p>
+                  </a:txBody>
+                  <a:tcPr/>
+                </a:tc>
+                <a:tc>
+                  <a:txBody>
+                    <a:bodyPr/>
+                    <a:lstStyle/>
+                    <a:p>
+                      <a:r>
+                        <a:rPr lang="de-DE" dirty="0" smtClean="0"/>
+                        <a:t>11.11.11.10</a:t>
+                      </a:r>
+                      <a:endParaRPr lang="de-DE" dirty="0"/>
+                    </a:p>
+                  </a:txBody>
+                  <a:tcPr/>
+                </a:tc>
+                <a:extLst>
+                  <a:ext uri="{0D108BD9-81ED-4DB2-BD59-A6C34878D82A}">
+                    <a16:rowId xmlns:a16="http://schemas.microsoft.com/office/drawing/2014/main" val="2860226033"/>
+                  </a:ext>
+                </a:extLst>
+              </a:tr>
+              <a:tr h="436584">
+                <a:tc>
+                  <a:txBody>
+                    <a:bodyPr/>
+                    <a:lstStyle/>
+                    <a:p>
+                      <a:r>
+                        <a:rPr lang="de-DE" dirty="0" smtClean="0"/>
+                        <a:t>Master#01</a:t>
+                      </a:r>
+                      <a:endParaRPr lang="de-DE" dirty="0"/>
+                    </a:p>
+                  </a:txBody>
+                  <a:tcPr/>
+                </a:tc>
+                <a:tc>
+                  <a:txBody>
+                    <a:bodyPr/>
+                    <a:lstStyle/>
+                    <a:p>
+                      <a:r>
+                        <a:rPr lang="de-DE" dirty="0" err="1" smtClean="0"/>
+                        <a:t>OpenShift</a:t>
+                      </a:r>
+                      <a:r>
+                        <a:rPr lang="de-DE" dirty="0" smtClean="0"/>
+                        <a:t> Master-Node#01</a:t>
+                      </a:r>
+                      <a:endParaRPr lang="de-DE" dirty="0"/>
+                    </a:p>
+                  </a:txBody>
+                  <a:tcPr/>
+                </a:tc>
+                <a:tc>
+                  <a:txBody>
+                    <a:bodyPr/>
+                    <a:lstStyle/>
+                    <a:p>
+                      <a:r>
+                        <a:rPr lang="de-DE" dirty="0" smtClean="0"/>
+                        <a:t>ocpmaster01</a:t>
+                      </a:r>
+                      <a:endParaRPr lang="de-DE" dirty="0"/>
+                    </a:p>
+                  </a:txBody>
+                  <a:tcPr/>
+                </a:tc>
+                <a:tc>
+                  <a:txBody>
+                    <a:bodyPr/>
+                    <a:lstStyle/>
+                    <a:p>
+                      <a:r>
+                        <a:rPr lang="de-DE" dirty="0" smtClean="0"/>
+                        <a:t>11.11.11.11</a:t>
+                      </a:r>
+                      <a:endParaRPr lang="de-DE" dirty="0"/>
+                    </a:p>
+                  </a:txBody>
+                  <a:tcPr/>
+                </a:tc>
+                <a:extLst>
+                  <a:ext uri="{0D108BD9-81ED-4DB2-BD59-A6C34878D82A}">
+                    <a16:rowId xmlns:a16="http://schemas.microsoft.com/office/drawing/2014/main" val="1084430636"/>
+                  </a:ext>
+                </a:extLst>
+              </a:tr>
+              <a:tr h="436584">
+                <a:tc>
+                  <a:txBody>
+                    <a:bodyPr/>
+                    <a:lstStyle/>
+                    <a:p>
+                      <a:pPr marL="0" marR="0" lvl="0" indent="0" algn="l" defTabSz="914400" rtl="0" eaLnBrk="1" fontAlgn="auto" latinLnBrk="0" hangingPunct="1">
+                        <a:lnSpc>
+                          <a:spcPct val="100000"/>
+                        </a:lnSpc>
+                        <a:spcBef>
+                          <a:spcPts val="0"/>
+                        </a:spcBef>
+                        <a:spcAft>
+                          <a:spcPts val="0"/>
+                        </a:spcAft>
+                        <a:buClrTx/>
+                        <a:buSzTx/>
+                        <a:buFontTx/>
+                        <a:buNone/>
+                        <a:tabLst/>
+                        <a:defRPr/>
+                      </a:pPr>
+                      <a:r>
+                        <a:rPr lang="de-DE" dirty="0" smtClean="0"/>
+                        <a:t>Master#02</a:t>
+                      </a:r>
+                    </a:p>
+                  </a:txBody>
+                  <a:tcPr/>
+                </a:tc>
+                <a:tc>
+                  <a:txBody>
+                    <a:bodyPr/>
+                    <a:lstStyle/>
+                    <a:p>
+                      <a:r>
+                        <a:rPr lang="de-DE" dirty="0" err="1" smtClean="0"/>
+                        <a:t>OpenShift</a:t>
+                      </a:r>
+                      <a:r>
+                        <a:rPr lang="de-DE" dirty="0" smtClean="0"/>
+                        <a:t> Master-Node#02</a:t>
+                      </a:r>
+                      <a:endParaRPr lang="de-DE" dirty="0"/>
+                    </a:p>
+                  </a:txBody>
+                  <a:tcPr/>
+                </a:tc>
+                <a:tc>
+                  <a:txBody>
+                    <a:bodyPr/>
+                    <a:lstStyle/>
+                    <a:p>
+                      <a:r>
+                        <a:rPr lang="de-DE" dirty="0" smtClean="0"/>
+                        <a:t>ocpmaster02</a:t>
+                      </a:r>
+                      <a:endParaRPr lang="de-DE" dirty="0"/>
+                    </a:p>
+                  </a:txBody>
+                  <a:tcPr/>
+                </a:tc>
+                <a:tc>
+                  <a:txBody>
+                    <a:bodyPr/>
+                    <a:lstStyle/>
+                    <a:p>
+                      <a:r>
+                        <a:rPr lang="de-DE" dirty="0" smtClean="0"/>
+                        <a:t>11.11.11.12</a:t>
+                      </a:r>
+                      <a:endParaRPr lang="de-DE" dirty="0"/>
+                    </a:p>
+                  </a:txBody>
+                  <a:tcPr/>
+                </a:tc>
+                <a:extLst>
+                  <a:ext uri="{0D108BD9-81ED-4DB2-BD59-A6C34878D82A}">
+                    <a16:rowId xmlns:a16="http://schemas.microsoft.com/office/drawing/2014/main" val="128526927"/>
+                  </a:ext>
+                </a:extLst>
+              </a:tr>
+              <a:tr h="436584">
+                <a:tc>
+                  <a:txBody>
+                    <a:bodyPr/>
+                    <a:lstStyle/>
+                    <a:p>
+                      <a:r>
+                        <a:rPr lang="de-DE" dirty="0" smtClean="0"/>
+                        <a:t>Master#03</a:t>
+                      </a:r>
+                      <a:endParaRPr lang="de-DE" dirty="0"/>
+                    </a:p>
+                  </a:txBody>
+                  <a:tcPr/>
+                </a:tc>
+                <a:tc>
+                  <a:txBody>
+                    <a:bodyPr/>
+                    <a:lstStyle/>
+                    <a:p>
+                      <a:r>
+                        <a:rPr lang="de-DE" dirty="0" err="1" smtClean="0"/>
+                        <a:t>OpenShift</a:t>
+                      </a:r>
+                      <a:r>
+                        <a:rPr lang="de-DE" dirty="0" smtClean="0"/>
+                        <a:t> Master-Node#03</a:t>
+                      </a:r>
+                      <a:endParaRPr lang="de-DE" dirty="0"/>
+                    </a:p>
+                  </a:txBody>
+                  <a:tcPr/>
+                </a:tc>
+                <a:tc>
+                  <a:txBody>
+                    <a:bodyPr/>
+                    <a:lstStyle/>
+                    <a:p>
+                      <a:r>
+                        <a:rPr lang="de-DE" dirty="0" smtClean="0"/>
+                        <a:t>ocpmaster03</a:t>
+                      </a:r>
+                      <a:endParaRPr lang="de-DE" dirty="0"/>
+                    </a:p>
+                  </a:txBody>
+                  <a:tcPr/>
+                </a:tc>
+                <a:tc>
+                  <a:txBody>
+                    <a:bodyPr/>
+                    <a:lstStyle/>
+                    <a:p>
+                      <a:r>
+                        <a:rPr lang="de-DE" dirty="0" smtClean="0"/>
+                        <a:t>11.11.11.13</a:t>
+                      </a:r>
+                      <a:endParaRPr lang="de-DE" dirty="0"/>
+                    </a:p>
+                  </a:txBody>
+                  <a:tcPr/>
+                </a:tc>
+                <a:extLst>
+                  <a:ext uri="{0D108BD9-81ED-4DB2-BD59-A6C34878D82A}">
+                    <a16:rowId xmlns:a16="http://schemas.microsoft.com/office/drawing/2014/main" val="222159813"/>
+                  </a:ext>
+                </a:extLst>
+              </a:tr>
+              <a:tr h="436584">
+                <a:tc>
+                  <a:txBody>
+                    <a:bodyPr/>
+                    <a:lstStyle/>
+                    <a:p>
+                      <a:r>
+                        <a:rPr lang="de-DE" dirty="0" smtClean="0"/>
+                        <a:t>Worker#01</a:t>
+                      </a:r>
+                      <a:endParaRPr lang="de-DE" dirty="0"/>
+                    </a:p>
+                  </a:txBody>
+                  <a:tcPr/>
+                </a:tc>
+                <a:tc>
+                  <a:txBody>
+                    <a:bodyPr/>
+                    <a:lstStyle/>
+                    <a:p>
+                      <a:r>
+                        <a:rPr lang="de-DE" dirty="0" err="1" smtClean="0"/>
+                        <a:t>OpenShift</a:t>
+                      </a:r>
+                      <a:r>
+                        <a:rPr lang="de-DE" dirty="0" smtClean="0"/>
+                        <a:t> Worker-Node#01</a:t>
+                      </a:r>
+                      <a:endParaRPr lang="de-DE" dirty="0"/>
+                    </a:p>
+                  </a:txBody>
+                  <a:tcPr/>
+                </a:tc>
+                <a:tc>
+                  <a:txBody>
+                    <a:bodyPr/>
+                    <a:lstStyle/>
+                    <a:p>
+                      <a:r>
+                        <a:rPr lang="de-DE" dirty="0" smtClean="0"/>
+                        <a:t>ocpworker01</a:t>
+                      </a:r>
+                      <a:endParaRPr lang="de-DE" dirty="0"/>
+                    </a:p>
+                  </a:txBody>
+                  <a:tcPr/>
+                </a:tc>
+                <a:tc>
+                  <a:txBody>
+                    <a:bodyPr/>
+                    <a:lstStyle/>
+                    <a:p>
+                      <a:r>
+                        <a:rPr lang="de-DE" dirty="0" smtClean="0"/>
+                        <a:t>11.11.11.14</a:t>
+                      </a:r>
+                      <a:endParaRPr lang="de-DE" dirty="0"/>
+                    </a:p>
+                  </a:txBody>
+                  <a:tcPr/>
+                </a:tc>
+                <a:extLst>
+                  <a:ext uri="{0D108BD9-81ED-4DB2-BD59-A6C34878D82A}">
+                    <a16:rowId xmlns:a16="http://schemas.microsoft.com/office/drawing/2014/main" val="2776491128"/>
+                  </a:ext>
+                </a:extLst>
+              </a:tr>
+              <a:tr h="436584">
+                <a:tc>
+                  <a:txBody>
+                    <a:bodyPr/>
+                    <a:lstStyle/>
+                    <a:p>
+                      <a:r>
+                        <a:rPr lang="de-DE" dirty="0" smtClean="0"/>
+                        <a:t>Worker#02</a:t>
+                      </a:r>
+                      <a:endParaRPr lang="de-DE" dirty="0"/>
+                    </a:p>
+                  </a:txBody>
+                  <a:tcPr/>
+                </a:tc>
+                <a:tc>
+                  <a:txBody>
+                    <a:bodyPr/>
+                    <a:lstStyle/>
+                    <a:p>
+                      <a:r>
+                        <a:rPr lang="de-DE" dirty="0" err="1" smtClean="0"/>
+                        <a:t>OpenShift</a:t>
+                      </a:r>
+                      <a:r>
+                        <a:rPr lang="de-DE" dirty="0" smtClean="0"/>
+                        <a:t> Worker-Node#02</a:t>
+                      </a:r>
+                      <a:endParaRPr lang="de-DE" dirty="0"/>
+                    </a:p>
+                  </a:txBody>
+                  <a:tcPr/>
+                </a:tc>
+                <a:tc>
+                  <a:txBody>
+                    <a:bodyPr/>
+                    <a:lstStyle/>
+                    <a:p>
+                      <a:r>
+                        <a:rPr lang="de-DE" dirty="0" smtClean="0"/>
+                        <a:t>ocpworker02</a:t>
+                      </a:r>
+                      <a:endParaRPr lang="de-DE" dirty="0"/>
+                    </a:p>
+                  </a:txBody>
+                  <a:tcPr/>
+                </a:tc>
+                <a:tc>
+                  <a:txBody>
+                    <a:bodyPr/>
+                    <a:lstStyle/>
+                    <a:p>
+                      <a:r>
+                        <a:rPr lang="de-DE" dirty="0" smtClean="0"/>
+                        <a:t>11.11.11.15</a:t>
+                      </a:r>
+                      <a:endParaRPr lang="de-DE" dirty="0"/>
+                    </a:p>
+                  </a:txBody>
+                  <a:tcPr/>
+                </a:tc>
+                <a:extLst>
+                  <a:ext uri="{0D108BD9-81ED-4DB2-BD59-A6C34878D82A}">
+                    <a16:rowId xmlns:a16="http://schemas.microsoft.com/office/drawing/2014/main" val="1663983966"/>
+                  </a:ext>
+                </a:extLst>
+              </a:tr>
+              <a:tr h="436584">
+                <a:tc>
+                  <a:txBody>
+                    <a:bodyPr/>
+                    <a:lstStyle/>
+                    <a:p>
+                      <a:r>
+                        <a:rPr lang="de-DE" dirty="0" smtClean="0"/>
+                        <a:t>Worker#03</a:t>
+                      </a:r>
+                      <a:endParaRPr lang="de-DE" dirty="0"/>
+                    </a:p>
+                  </a:txBody>
+                  <a:tcPr/>
+                </a:tc>
+                <a:tc>
+                  <a:txBody>
+                    <a:bodyPr/>
+                    <a:lstStyle/>
+                    <a:p>
+                      <a:r>
+                        <a:rPr lang="de-DE" dirty="0" err="1" smtClean="0"/>
+                        <a:t>OpenShift</a:t>
+                      </a:r>
+                      <a:r>
+                        <a:rPr lang="de-DE" dirty="0" smtClean="0"/>
+                        <a:t> Worker-Node#03</a:t>
+                      </a:r>
+                      <a:endParaRPr lang="de-DE" dirty="0"/>
+                    </a:p>
+                  </a:txBody>
+                  <a:tcPr/>
+                </a:tc>
+                <a:tc>
+                  <a:txBody>
+                    <a:bodyPr/>
+                    <a:lstStyle/>
+                    <a:p>
+                      <a:r>
+                        <a:rPr lang="de-DE" dirty="0" smtClean="0"/>
+                        <a:t>ocpworker03</a:t>
+                      </a:r>
+                      <a:endParaRPr lang="de-DE" dirty="0"/>
+                    </a:p>
+                  </a:txBody>
+                  <a:tcPr/>
+                </a:tc>
+                <a:tc>
+                  <a:txBody>
+                    <a:bodyPr/>
+                    <a:lstStyle/>
+                    <a:p>
+                      <a:r>
+                        <a:rPr lang="de-DE" dirty="0" smtClean="0"/>
+                        <a:t>11.11.11.16</a:t>
+                      </a:r>
+                      <a:endParaRPr lang="de-DE" dirty="0"/>
+                    </a:p>
+                  </a:txBody>
+                  <a:tcPr/>
+                </a:tc>
+                <a:extLst>
+                  <a:ext uri="{0D108BD9-81ED-4DB2-BD59-A6C34878D82A}">
+                    <a16:rowId xmlns:a16="http://schemas.microsoft.com/office/drawing/2014/main" val="545400745"/>
+                  </a:ext>
+                </a:extLst>
+              </a:tr>
+              <a:tr h="436584">
+                <a:tc>
+                  <a:txBody>
+                    <a:bodyPr/>
+                    <a:lstStyle/>
+                    <a:p>
+                      <a:r>
+                        <a:rPr lang="de-DE" dirty="0" smtClean="0"/>
+                        <a:t>Bootstrap-Host</a:t>
+                      </a:r>
+                      <a:endParaRPr lang="de-DE" dirty="0"/>
+                    </a:p>
+                  </a:txBody>
+                  <a:tcPr/>
+                </a:tc>
+                <a:tc>
+                  <a:txBody>
+                    <a:bodyPr/>
+                    <a:lstStyle/>
+                    <a:p>
+                      <a:r>
+                        <a:rPr lang="de-DE" dirty="0" smtClean="0"/>
+                        <a:t>temporärer </a:t>
+                      </a:r>
+                      <a:r>
+                        <a:rPr lang="de-DE" dirty="0" err="1" smtClean="0"/>
+                        <a:t>Node</a:t>
+                      </a:r>
+                      <a:r>
+                        <a:rPr lang="de-DE" dirty="0" smtClean="0"/>
+                        <a:t> zum Installieren des Clusters</a:t>
+                      </a:r>
+                      <a:endParaRPr lang="de-DE" dirty="0"/>
+                    </a:p>
+                  </a:txBody>
+                  <a:tcPr/>
+                </a:tc>
+                <a:tc>
+                  <a:txBody>
+                    <a:bodyPr/>
+                    <a:lstStyle/>
+                    <a:p>
+                      <a:r>
+                        <a:rPr lang="de-DE" dirty="0" smtClean="0"/>
+                        <a:t>ocpbootstrap01</a:t>
+                      </a:r>
+                      <a:endParaRPr lang="de-DE" dirty="0"/>
+                    </a:p>
+                  </a:txBody>
+                  <a:tcPr/>
+                </a:tc>
+                <a:tc>
+                  <a:txBody>
+                    <a:bodyPr/>
+                    <a:lstStyle/>
+                    <a:p>
+                      <a:r>
+                        <a:rPr lang="de-DE" dirty="0" smtClean="0"/>
+                        <a:t>11.11.11.99</a:t>
+                      </a:r>
+                      <a:endParaRPr lang="de-DE" dirty="0"/>
+                    </a:p>
+                  </a:txBody>
+                  <a:tcPr/>
+                </a:tc>
+                <a:extLst>
+                  <a:ext uri="{0D108BD9-81ED-4DB2-BD59-A6C34878D82A}">
+                    <a16:rowId xmlns:a16="http://schemas.microsoft.com/office/drawing/2014/main" val="88185719"/>
+                  </a:ext>
+                </a:extLst>
+              </a:tr>
+            </a:tbl>
+          </a:graphicData>
+        </a:graphic>
+      </p:graphicFrame>
+    </p:spTree>
+    <p:extLst>
+      <p:ext uri="{BB962C8B-B14F-4D97-AF65-F5344CB8AC3E}">
+        <p14:creationId xmlns:p14="http://schemas.microsoft.com/office/powerpoint/2010/main" val="1278377530"/>
+      </p:ext>
+    </p:extLst>
+  </p:cSld>
+  <p:clrMapOvr>
+    <a:masterClrMapping/>
+  </p:clrMapOvr>
+  <p:timing>
+    <p:tnLst>
+      <p:par>
+        <p:cTn id="1" dur="indefinite" restart="never" nodeType="tmRoot"/>
+      </p:par>
+    </p:tnLst>
   </p:timing>
 </p:sld>
 </file>

</xml_diff>